<commit_message>
Keep local-model runtime only and add final submission document
</commit_message>
<xml_diff>
--- a/docs/MSc_RAG_Project_Vels_University.pptx
+++ b/docs/MSc_RAG_Project_Vels_University.pptx
@@ -27,6 +27,7 @@
     <p:sldId id="275" r:id="rId26"/>
     <p:sldId id="276" r:id="rId27"/>
     <p:sldId id="277" r:id="rId28"/>
+    <p:sldId id="278" r:id="rId29"/>
   </p:sldIdLst>
   <p:sldSz cx="9144000" cy="6858000" type="screen4x3"/>
   <p:notesSz cx="6858000" cy="9144000"/>
@@ -3545,7 +3546,7 @@
           <a:lstStyle/>
           <a:p>
             <a:r>
-              <a:t>Experimental Strategy</a:t>
+              <a:t>Model Execution Mode</a:t>
             </a:r>
           </a:p>
         </p:txBody>
@@ -3569,31 +3570,31 @@
               <a:defRPr sz="2200"/>
             </a:pPr>
             <a:r>
-              <a:t>Experiment 1: Baseline LLM</a:t>
-            </a:r>
-          </a:p>
-          <a:p>
-            <a:pPr>
-              <a:defRPr sz="2200"/>
-            </a:pPr>
-            <a:r>
-              <a:t>Experiment 2: Basic RAG</a:t>
-            </a:r>
-          </a:p>
-          <a:p>
-            <a:pPr>
-              <a:defRPr sz="2200"/>
-            </a:pPr>
-            <a:r>
-              <a:t>Experiment 3: Optimized RAG</a:t>
-            </a:r>
-          </a:p>
-          <a:p>
-            <a:pPr>
-              <a:defRPr sz="2200"/>
-            </a:pPr>
-            <a:r>
-              <a:t>Compare quality and latency across all setups</a:t>
+              <a:t>Current implementation uses local models only</a:t>
+            </a:r>
+          </a:p>
+          <a:p>
+            <a:pPr>
+              <a:defRPr sz="2200"/>
+            </a:pPr>
+            <a:r>
+              <a:t>No OpenAI API key is required for this submission</a:t>
+            </a:r>
+          </a:p>
+          <a:p>
+            <a:pPr>
+              <a:defRPr sz="2200"/>
+            </a:pPr>
+            <a:r>
+              <a:t>Offline mock mode is available for restricted environments</a:t>
+            </a:r>
+          </a:p>
+          <a:p>
+            <a:pPr>
+              <a:defRPr sz="2200"/>
+            </a:pPr>
+            <a:r>
+              <a:t>OpenAI integration can be added later as future scope</a:t>
             </a:r>
           </a:p>
         </p:txBody>
@@ -3632,7 +3633,7 @@
           <a:lstStyle/>
           <a:p>
             <a:r>
-              <a:t>Evaluation Metrics</a:t>
+              <a:t>Experimental Strategy</a:t>
             </a:r>
           </a:p>
         </p:txBody>
@@ -3656,31 +3657,31 @@
               <a:defRPr sz="2200"/>
             </a:pPr>
             <a:r>
-              <a:t>Hallucination Rate (proxy)</a:t>
-            </a:r>
-          </a:p>
-          <a:p>
-            <a:pPr>
-              <a:defRPr sz="2200"/>
-            </a:pPr>
-            <a:r>
-              <a:t>Factual Accuracy (proxy)</a:t>
-            </a:r>
-          </a:p>
-          <a:p>
-            <a:pPr>
-              <a:defRPr sz="2200"/>
-            </a:pPr>
-            <a:r>
-              <a:t>Precision@K and Recall@K (retrieval quality)</a:t>
-            </a:r>
-          </a:p>
-          <a:p>
-            <a:pPr>
-              <a:defRPr sz="2200"/>
-            </a:pPr>
-            <a:r>
-              <a:t>Latency (ms) and computational cost</a:t>
+              <a:t>Experiment 1: Baseline LLM</a:t>
+            </a:r>
+          </a:p>
+          <a:p>
+            <a:pPr>
+              <a:defRPr sz="2200"/>
+            </a:pPr>
+            <a:r>
+              <a:t>Experiment 2: Basic RAG</a:t>
+            </a:r>
+          </a:p>
+          <a:p>
+            <a:pPr>
+              <a:defRPr sz="2200"/>
+            </a:pPr>
+            <a:r>
+              <a:t>Experiment 3: Optimized RAG</a:t>
+            </a:r>
+          </a:p>
+          <a:p>
+            <a:pPr>
+              <a:defRPr sz="2200"/>
+            </a:pPr>
+            <a:r>
+              <a:t>Compare quality and latency across all setups</a:t>
             </a:r>
           </a:p>
         </p:txBody>
@@ -3719,7 +3720,7 @@
           <a:lstStyle/>
           <a:p>
             <a:r>
-              <a:t>Implementation Deliverables</a:t>
+              <a:t>Evaluation Metrics</a:t>
             </a:r>
           </a:p>
         </p:txBody>
@@ -3743,39 +3744,31 @@
               <a:defRPr sz="2200"/>
             </a:pPr>
             <a:r>
-              <a:t>Document ingestion script</a:t>
-            </a:r>
-          </a:p>
-          <a:p>
-            <a:pPr>
-              <a:defRPr sz="2200"/>
-            </a:pPr>
-            <a:r>
-              <a:t>FAISS indexing pipeline</a:t>
-            </a:r>
-          </a:p>
-          <a:p>
-            <a:pPr>
-              <a:defRPr sz="2200"/>
-            </a:pPr>
-            <a:r>
-              <a:t>API endpoint for baseline and RAG queries</a:t>
-            </a:r>
-          </a:p>
-          <a:p>
-            <a:pPr>
-              <a:defRPr sz="2200"/>
-            </a:pPr>
-            <a:r>
-              <a:t>Experiment runner with JSON result output</a:t>
-            </a:r>
-          </a:p>
-          <a:p>
-            <a:pPr>
-              <a:defRPr sz="2200"/>
-            </a:pPr>
-            <a:r>
-              <a:t>Dockerized cloud deployment setup</a:t>
+              <a:t>Hallucination Rate (proxy)</a:t>
+            </a:r>
+          </a:p>
+          <a:p>
+            <a:pPr>
+              <a:defRPr sz="2200"/>
+            </a:pPr>
+            <a:r>
+              <a:t>Factual Accuracy (proxy)</a:t>
+            </a:r>
+          </a:p>
+          <a:p>
+            <a:pPr>
+              <a:defRPr sz="2200"/>
+            </a:pPr>
+            <a:r>
+              <a:t>Precision@K and Recall@K (retrieval quality)</a:t>
+            </a:r>
+          </a:p>
+          <a:p>
+            <a:pPr>
+              <a:defRPr sz="2200"/>
+            </a:pPr>
+            <a:r>
+              <a:t>Latency (ms) and computational cost</a:t>
             </a:r>
           </a:p>
         </p:txBody>
@@ -3789,6 +3782,101 @@
 </file>
 
 <file path=ppt/slides/slide16.xml><?xml version="1.0" encoding="utf-8"?>
+<p:sld xmlns:a="http://schemas.openxmlformats.org/drawingml/2006/main" xmlns:p="http://schemas.openxmlformats.org/presentationml/2006/main" xmlns:r="http://schemas.openxmlformats.org/officeDocument/2006/relationships">
+  <p:cSld>
+    <p:spTree>
+      <p:nvGrpSpPr>
+        <p:cNvPr id="1" name=""/>
+        <p:cNvGrpSpPr/>
+        <p:nvPr/>
+      </p:nvGrpSpPr>
+      <p:grpSpPr/>
+      <p:sp>
+        <p:nvSpPr>
+          <p:cNvPr id="2" name="Title 1"/>
+          <p:cNvSpPr>
+            <a:spLocks noGrp="1"/>
+          </p:cNvSpPr>
+          <p:nvPr>
+            <p:ph type="title"/>
+          </p:nvPr>
+        </p:nvSpPr>
+        <p:spPr/>
+        <p:txBody>
+          <a:bodyPr/>
+          <a:lstStyle/>
+          <a:p>
+            <a:r>
+              <a:t>Implementation Deliverables</a:t>
+            </a:r>
+          </a:p>
+        </p:txBody>
+      </p:sp>
+      <p:sp>
+        <p:nvSpPr>
+          <p:cNvPr id="3" name="Content Placeholder 2"/>
+          <p:cNvSpPr>
+            <a:spLocks noGrp="1"/>
+          </p:cNvSpPr>
+          <p:nvPr>
+            <p:ph idx="1"/>
+          </p:nvPr>
+        </p:nvSpPr>
+        <p:spPr/>
+        <p:txBody>
+          <a:bodyPr/>
+          <a:lstStyle/>
+          <a:p>
+            <a:pPr>
+              <a:defRPr sz="2200"/>
+            </a:pPr>
+            <a:r>
+              <a:t>Document ingestion script</a:t>
+            </a:r>
+          </a:p>
+          <a:p>
+            <a:pPr>
+              <a:defRPr sz="2200"/>
+            </a:pPr>
+            <a:r>
+              <a:t>FAISS indexing pipeline</a:t>
+            </a:r>
+          </a:p>
+          <a:p>
+            <a:pPr>
+              <a:defRPr sz="2200"/>
+            </a:pPr>
+            <a:r>
+              <a:t>API endpoint for baseline and RAG queries</a:t>
+            </a:r>
+          </a:p>
+          <a:p>
+            <a:pPr>
+              <a:defRPr sz="2200"/>
+            </a:pPr>
+            <a:r>
+              <a:t>Experiment runner with JSON result output</a:t>
+            </a:r>
+          </a:p>
+          <a:p>
+            <a:pPr>
+              <a:defRPr sz="2200"/>
+            </a:pPr>
+            <a:r>
+              <a:t>Dockerized cloud deployment setup</a:t>
+            </a:r>
+          </a:p>
+        </p:txBody>
+      </p:sp>
+    </p:spTree>
+  </p:cSld>
+  <p:clrMapOvr>
+    <a:masterClrMapping/>
+  </p:clrMapOvr>
+</p:sld>
+</file>
+
+<file path=ppt/slides/slide17.xml><?xml version="1.0" encoding="utf-8"?>
 <p:sld xmlns:a="http://schemas.openxmlformats.org/drawingml/2006/main" xmlns:p="http://schemas.openxmlformats.org/presentationml/2006/main" xmlns:r="http://schemas.openxmlformats.org/officeDocument/2006/relationships">
   <p:cSld>
     <p:spTree>
@@ -3882,7 +3970,7 @@
 </p:sld>
 </file>
 
-<file path=ppt/slides/slide17.xml><?xml version="1.0" encoding="utf-8"?>
+<file path=ppt/slides/slide18.xml><?xml version="1.0" encoding="utf-8"?>
 <p:sld xmlns:a="http://schemas.openxmlformats.org/drawingml/2006/main" xmlns:p="http://schemas.openxmlformats.org/presentationml/2006/main" xmlns:r="http://schemas.openxmlformats.org/officeDocument/2006/relationships">
   <p:cSld>
     <p:spTree>
@@ -3976,109 +4064,6 @@
 </p:sld>
 </file>
 
-<file path=ppt/slides/slide18.xml><?xml version="1.0" encoding="utf-8"?>
-<p:sld xmlns:a="http://schemas.openxmlformats.org/drawingml/2006/main" xmlns:p="http://schemas.openxmlformats.org/presentationml/2006/main" xmlns:r="http://schemas.openxmlformats.org/officeDocument/2006/relationships">
-  <p:cSld>
-    <p:spTree>
-      <p:nvGrpSpPr>
-        <p:cNvPr id="1" name=""/>
-        <p:cNvGrpSpPr/>
-        <p:nvPr/>
-      </p:nvGrpSpPr>
-      <p:grpSpPr/>
-      <p:sp>
-        <p:nvSpPr>
-          <p:cNvPr id="2" name="Title 1"/>
-          <p:cNvSpPr>
-            <a:spLocks noGrp="1"/>
-          </p:cNvSpPr>
-          <p:nvPr>
-            <p:ph type="title"/>
-          </p:nvPr>
-        </p:nvSpPr>
-        <p:spPr/>
-        <p:txBody>
-          <a:bodyPr/>
-          <a:lstStyle/>
-          <a:p>
-            <a:r>
-              <a:t>Six-Month Timeline</a:t>
-            </a:r>
-          </a:p>
-        </p:txBody>
-      </p:sp>
-      <p:sp>
-        <p:nvSpPr>
-          <p:cNvPr id="3" name="Content Placeholder 2"/>
-          <p:cNvSpPr>
-            <a:spLocks noGrp="1"/>
-          </p:cNvSpPr>
-          <p:nvPr>
-            <p:ph idx="1"/>
-          </p:nvPr>
-        </p:nvSpPr>
-        <p:spPr/>
-        <p:txBody>
-          <a:bodyPr/>
-          <a:lstStyle/>
-          <a:p>
-            <a:pPr>
-              <a:defRPr sz="2200"/>
-            </a:pPr>
-            <a:r>
-              <a:t>Month 1: Fundamentals + literature review</a:t>
-            </a:r>
-          </a:p>
-          <a:p>
-            <a:pPr>
-              <a:defRPr sz="2200"/>
-            </a:pPr>
-            <a:r>
-              <a:t>Month 2: Ingestion and indexing</a:t>
-            </a:r>
-          </a:p>
-          <a:p>
-            <a:pPr>
-              <a:defRPr sz="2200"/>
-            </a:pPr>
-            <a:r>
-              <a:t>Month 3: Baseline + RAG implementation</a:t>
-            </a:r>
-          </a:p>
-          <a:p>
-            <a:pPr>
-              <a:defRPr sz="2200"/>
-            </a:pPr>
-            <a:r>
-              <a:t>Month 4: Evaluation module and tuning</a:t>
-            </a:r>
-          </a:p>
-          <a:p>
-            <a:pPr>
-              <a:defRPr sz="2200"/>
-            </a:pPr>
-            <a:r>
-              <a:t>Month 5: Cloud deployment and full testing</a:t>
-            </a:r>
-          </a:p>
-          <a:p>
-            <a:pPr>
-              <a:defRPr sz="2200"/>
-            </a:pPr>
-            <a:r>
-              <a:t>Month 6: Final experiments + dissertation + viva</a:t>
-            </a:r>
-          </a:p>
-        </p:txBody>
-      </p:sp>
-    </p:spTree>
-  </p:cSld>
-  <p:clrMapOvr>
-    <a:masterClrMapping/>
-  </p:clrMapOvr>
-</p:sld>
-</file>
-
 <file path=ppt/slides/slide19.xml><?xml version="1.0" encoding="utf-8"?>
 <p:sld xmlns:a="http://schemas.openxmlformats.org/drawingml/2006/main" xmlns:p="http://schemas.openxmlformats.org/presentationml/2006/main" xmlns:r="http://schemas.openxmlformats.org/officeDocument/2006/relationships">
   <p:cSld>
@@ -4105,7 +4090,7 @@
           <a:lstStyle/>
           <a:p>
             <a:r>
-              <a:t>Risks and Mitigation</a:t>
+              <a:t>Six-Month Timeline</a:t>
             </a:r>
           </a:p>
         </p:txBody>
@@ -4129,31 +4114,47 @@
               <a:defRPr sz="2200"/>
             </a:pPr>
             <a:r>
-              <a:t>Data quality risk -&gt; source validation</a:t>
-            </a:r>
-          </a:p>
-          <a:p>
-            <a:pPr>
-              <a:defRPr sz="2200"/>
-            </a:pPr>
-            <a:r>
-              <a:t>Model/runtime limits -&gt; lighter model fallback</a:t>
-            </a:r>
-          </a:p>
-          <a:p>
-            <a:pPr>
-              <a:defRPr sz="2200"/>
-            </a:pPr>
-            <a:r>
-              <a:t>Cloud security risk -&gt; least privilege and TLS</a:t>
-            </a:r>
-          </a:p>
-          <a:p>
-            <a:pPr>
-              <a:defRPr sz="2200"/>
-            </a:pPr>
-            <a:r>
-              <a:t>Schedule overrun -&gt; weekly milestone tracking</a:t>
+              <a:t>Month 1: Fundamentals + literature review</a:t>
+            </a:r>
+          </a:p>
+          <a:p>
+            <a:pPr>
+              <a:defRPr sz="2200"/>
+            </a:pPr>
+            <a:r>
+              <a:t>Month 2: Ingestion and indexing</a:t>
+            </a:r>
+          </a:p>
+          <a:p>
+            <a:pPr>
+              <a:defRPr sz="2200"/>
+            </a:pPr>
+            <a:r>
+              <a:t>Month 3: Baseline + RAG implementation</a:t>
+            </a:r>
+          </a:p>
+          <a:p>
+            <a:pPr>
+              <a:defRPr sz="2200"/>
+            </a:pPr>
+            <a:r>
+              <a:t>Month 4: Evaluation module and tuning</a:t>
+            </a:r>
+          </a:p>
+          <a:p>
+            <a:pPr>
+              <a:defRPr sz="2200"/>
+            </a:pPr>
+            <a:r>
+              <a:t>Month 5: Cloud deployment and full testing</a:t>
+            </a:r>
+          </a:p>
+          <a:p>
+            <a:pPr>
+              <a:defRPr sz="2200"/>
+            </a:pPr>
+            <a:r>
+              <a:t>Month 6: Final experiments + dissertation + viva</a:t>
             </a:r>
           </a:p>
         </p:txBody>
@@ -4295,7 +4296,7 @@
           <a:lstStyle/>
           <a:p>
             <a:r>
-              <a:t>Expected Outcomes</a:t>
+              <a:t>Risks and Mitigation</a:t>
             </a:r>
           </a:p>
         </p:txBody>
@@ -4319,31 +4320,31 @@
               <a:defRPr sz="2200"/>
             </a:pPr>
             <a:r>
-              <a:t>Measured reduction in hallucination with RAG</a:t>
-            </a:r>
-          </a:p>
-          <a:p>
-            <a:pPr>
-              <a:defRPr sz="2200"/>
-            </a:pPr>
-            <a:r>
-              <a:t>Improved factual grounding and answer trustworthiness</a:t>
-            </a:r>
-          </a:p>
-          <a:p>
-            <a:pPr>
-              <a:defRPr sz="2200"/>
-            </a:pPr>
-            <a:r>
-              <a:t>Reproducible academic and technical artifacts</a:t>
-            </a:r>
-          </a:p>
-          <a:p>
-            <a:pPr>
-              <a:defRPr sz="2200"/>
-            </a:pPr>
-            <a:r>
-              <a:t>Practical guidance for enterprise AI assistants</a:t>
+              <a:t>Data quality risk -&gt; source validation</a:t>
+            </a:r>
+          </a:p>
+          <a:p>
+            <a:pPr>
+              <a:defRPr sz="2200"/>
+            </a:pPr>
+            <a:r>
+              <a:t>Model/runtime limits -&gt; lighter model fallback</a:t>
+            </a:r>
+          </a:p>
+          <a:p>
+            <a:pPr>
+              <a:defRPr sz="2200"/>
+            </a:pPr>
+            <a:r>
+              <a:t>Cloud security risk -&gt; least privilege and TLS</a:t>
+            </a:r>
+          </a:p>
+          <a:p>
+            <a:pPr>
+              <a:defRPr sz="2200"/>
+            </a:pPr>
+            <a:r>
+              <a:t>Schedule overrun -&gt; weekly milestone tracking</a:t>
             </a:r>
           </a:p>
         </p:txBody>
@@ -4382,7 +4383,7 @@
           <a:lstStyle/>
           <a:p>
             <a:r>
-              <a:t>Conclusion</a:t>
+              <a:t>Expected Outcomes</a:t>
             </a:r>
           </a:p>
         </p:txBody>
@@ -4406,31 +4407,31 @@
               <a:defRPr sz="2200"/>
             </a:pPr>
             <a:r>
-              <a:t>RAG is a practical method to improve factual reliability</a:t>
-            </a:r>
-          </a:p>
-          <a:p>
-            <a:pPr>
-              <a:defRPr sz="2200"/>
-            </a:pPr>
-            <a:r>
-              <a:t>This project combines engineering and experimental rigor</a:t>
-            </a:r>
-          </a:p>
-          <a:p>
-            <a:pPr>
-              <a:defRPr sz="2200"/>
-            </a:pPr>
-            <a:r>
-              <a:t>Framework is cloud-ready and reproducible</a:t>
-            </a:r>
-          </a:p>
-          <a:p>
-            <a:pPr>
-              <a:defRPr sz="2200"/>
-            </a:pPr>
-            <a:r>
-              <a:t>Future work: reranking, citation verification, human eval</a:t>
+              <a:t>Measured reduction in hallucination with RAG</a:t>
+            </a:r>
+          </a:p>
+          <a:p>
+            <a:pPr>
+              <a:defRPr sz="2200"/>
+            </a:pPr>
+            <a:r>
+              <a:t>Improved factual grounding and answer trustworthiness</a:t>
+            </a:r>
+          </a:p>
+          <a:p>
+            <a:pPr>
+              <a:defRPr sz="2200"/>
+            </a:pPr>
+            <a:r>
+              <a:t>Reproducible academic and technical artifacts</a:t>
+            </a:r>
+          </a:p>
+          <a:p>
+            <a:pPr>
+              <a:defRPr sz="2200"/>
+            </a:pPr>
+            <a:r>
+              <a:t>Practical guidance for enterprise AI assistants</a:t>
             </a:r>
           </a:p>
         </p:txBody>
@@ -4444,6 +4445,93 @@
 </file>
 
 <file path=ppt/slides/slide22.xml><?xml version="1.0" encoding="utf-8"?>
+<p:sld xmlns:a="http://schemas.openxmlformats.org/drawingml/2006/main" xmlns:p="http://schemas.openxmlformats.org/presentationml/2006/main" xmlns:r="http://schemas.openxmlformats.org/officeDocument/2006/relationships">
+  <p:cSld>
+    <p:spTree>
+      <p:nvGrpSpPr>
+        <p:cNvPr id="1" name=""/>
+        <p:cNvGrpSpPr/>
+        <p:nvPr/>
+      </p:nvGrpSpPr>
+      <p:grpSpPr/>
+      <p:sp>
+        <p:nvSpPr>
+          <p:cNvPr id="2" name="Title 1"/>
+          <p:cNvSpPr>
+            <a:spLocks noGrp="1"/>
+          </p:cNvSpPr>
+          <p:nvPr>
+            <p:ph type="title"/>
+          </p:nvPr>
+        </p:nvSpPr>
+        <p:spPr/>
+        <p:txBody>
+          <a:bodyPr/>
+          <a:lstStyle/>
+          <a:p>
+            <a:r>
+              <a:t>Conclusion</a:t>
+            </a:r>
+          </a:p>
+        </p:txBody>
+      </p:sp>
+      <p:sp>
+        <p:nvSpPr>
+          <p:cNvPr id="3" name="Content Placeholder 2"/>
+          <p:cNvSpPr>
+            <a:spLocks noGrp="1"/>
+          </p:cNvSpPr>
+          <p:nvPr>
+            <p:ph idx="1"/>
+          </p:nvPr>
+        </p:nvSpPr>
+        <p:spPr/>
+        <p:txBody>
+          <a:bodyPr/>
+          <a:lstStyle/>
+          <a:p>
+            <a:pPr>
+              <a:defRPr sz="2200"/>
+            </a:pPr>
+            <a:r>
+              <a:t>RAG is a practical method to improve factual reliability</a:t>
+            </a:r>
+          </a:p>
+          <a:p>
+            <a:pPr>
+              <a:defRPr sz="2200"/>
+            </a:pPr>
+            <a:r>
+              <a:t>This project combines engineering and experimental rigor</a:t>
+            </a:r>
+          </a:p>
+          <a:p>
+            <a:pPr>
+              <a:defRPr sz="2200"/>
+            </a:pPr>
+            <a:r>
+              <a:t>Framework is cloud-ready and reproducible</a:t>
+            </a:r>
+          </a:p>
+          <a:p>
+            <a:pPr>
+              <a:defRPr sz="2200"/>
+            </a:pPr>
+            <a:r>
+              <a:t>Future work: reranking, citation verification, human eval</a:t>
+            </a:r>
+          </a:p>
+        </p:txBody>
+      </p:sp>
+    </p:spTree>
+  </p:cSld>
+  <p:clrMapOvr>
+    <a:masterClrMapping/>
+  </p:clrMapOvr>
+</p:sld>
+</file>
+
+<file path=ppt/slides/slide23.xml><?xml version="1.0" encoding="utf-8"?>
 <p:sld xmlns:a="http://schemas.openxmlformats.org/drawingml/2006/main" xmlns:p="http://schemas.openxmlformats.org/presentationml/2006/main" xmlns:r="http://schemas.openxmlformats.org/officeDocument/2006/relationships">
   <p:cSld>
     <p:spTree>

</xml_diff>

<commit_message>
Add simple architecture overview doc and PPT slide
</commit_message>
<xml_diff>
--- a/docs/MSc_RAG_Project_Vels_University.pptx
+++ b/docs/MSc_RAG_Project_Vels_University.pptx
@@ -28,6 +28,7 @@
     <p:sldId id="276" r:id="rId27"/>
     <p:sldId id="277" r:id="rId28"/>
     <p:sldId id="278" r:id="rId29"/>
+    <p:sldId id="279" r:id="rId30"/>
   </p:sldIdLst>
   <p:sldSz cx="9144000" cy="6858000" type="screen4x3"/>
   <p:notesSz cx="6858000" cy="9144000"/>
@@ -3286,133 +3287,63 @@
           <a:lstStyle/>
           <a:p>
             <a:r>
-              <a:t>Baseline vs RAG</a:t>
-            </a:r>
-          </a:p>
-        </p:txBody>
-      </p:sp>
-      <p:sp>
-        <p:nvSpPr>
-          <p:cNvPr id="3" name="TextBox 2"/>
-          <p:cNvSpPr txBox="1"/>
-          <p:nvPr/>
-        </p:nvSpPr>
-        <p:spPr>
-          <a:xfrm>
-            <a:off x="548640" y="1463040"/>
-            <a:ext cx="5486400" cy="4389120"/>
-          </a:xfrm>
-          <a:prstGeom prst="rect">
-            <a:avLst/>
-          </a:prstGeom>
-          <a:noFill/>
-        </p:spPr>
-        <p:txBody>
-          <a:bodyPr wrap="none">
-            <a:spAutoFit/>
-          </a:bodyPr>
-          <a:lstStyle/>
-          <a:p>
-            <a:pPr>
-              <a:defRPr b="1" sz="2400"/>
-            </a:pPr>
-            <a:r>
-              <a:t>Baseline LLM</a:t>
-            </a:r>
-          </a:p>
-          <a:p>
-            <a:pPr>
-              <a:defRPr sz="2000"/>
-            </a:pPr>
-            <a:r>
-              <a:t>Direct question to model</a:t>
-            </a:r>
-          </a:p>
-          <a:p>
-            <a:pPr>
-              <a:defRPr sz="2000"/>
-            </a:pPr>
-            <a:r>
-              <a:t>No external evidence grounding</a:t>
-            </a:r>
-          </a:p>
-          <a:p>
-            <a:pPr>
-              <a:defRPr sz="2000"/>
-            </a:pPr>
-            <a:r>
-              <a:t>Lower latency</a:t>
-            </a:r>
-          </a:p>
-          <a:p>
-            <a:pPr>
-              <a:defRPr sz="2000"/>
-            </a:pPr>
-            <a:r>
-              <a:t>Higher hallucination risk</a:t>
-            </a:r>
-          </a:p>
-        </p:txBody>
-      </p:sp>
-      <p:sp>
-        <p:nvSpPr>
-          <p:cNvPr id="4" name="TextBox 3"/>
-          <p:cNvSpPr txBox="1"/>
-          <p:nvPr/>
-        </p:nvSpPr>
-        <p:spPr>
-          <a:xfrm>
-            <a:off x="6217920" y="1463040"/>
-            <a:ext cx="5486400" cy="4389120"/>
-          </a:xfrm>
-          <a:prstGeom prst="rect">
-            <a:avLst/>
-          </a:prstGeom>
-          <a:noFill/>
-        </p:spPr>
-        <p:txBody>
-          <a:bodyPr wrap="none">
-            <a:spAutoFit/>
-          </a:bodyPr>
-          <a:lstStyle/>
-          <a:p>
-            <a:pPr>
-              <a:defRPr b="1" sz="2400"/>
-            </a:pPr>
-            <a:r>
-              <a:t>RAG LLM</a:t>
-            </a:r>
-          </a:p>
-          <a:p>
-            <a:pPr>
-              <a:defRPr sz="2000"/>
-            </a:pPr>
-            <a:r>
-              <a:t>Retrieves relevant evidence</a:t>
-            </a:r>
-          </a:p>
-          <a:p>
-            <a:pPr>
-              <a:defRPr sz="2000"/>
-            </a:pPr>
-            <a:r>
-              <a:t>Context-grounded answer generation</a:t>
-            </a:r>
-          </a:p>
-          <a:p>
-            <a:pPr>
-              <a:defRPr sz="2000"/>
-            </a:pPr>
-            <a:r>
-              <a:t>Slight latency overhead</a:t>
-            </a:r>
-          </a:p>
-          <a:p>
-            <a:pPr>
-              <a:defRPr sz="2000"/>
-            </a:pPr>
-            <a:r>
-              <a:t>Better factual reliability</a:t>
+              <a:t>Simple Architecture (Easy View)</a:t>
+            </a:r>
+          </a:p>
+        </p:txBody>
+      </p:sp>
+      <p:sp>
+        <p:nvSpPr>
+          <p:cNvPr id="3" name="Content Placeholder 2"/>
+          <p:cNvSpPr>
+            <a:spLocks noGrp="1"/>
+          </p:cNvSpPr>
+          <p:nvPr>
+            <p:ph idx="1"/>
+          </p:nvPr>
+        </p:nvSpPr>
+        <p:spPr/>
+        <p:txBody>
+          <a:bodyPr/>
+          <a:lstStyle/>
+          <a:p>
+            <a:pPr>
+              <a:defRPr sz="2200"/>
+            </a:pPr>
+            <a:r>
+              <a:t>User/Web UI -&gt; FastAPI Backend</a:t>
+            </a:r>
+          </a:p>
+          <a:p>
+            <a:pPr>
+              <a:defRPr sz="2200"/>
+            </a:pPr>
+            <a:r>
+              <a:t>Backend -&gt; Retriever -&gt; FAISS Index</a:t>
+            </a:r>
+          </a:p>
+          <a:p>
+            <a:pPr>
+              <a:defRPr sz="2200"/>
+            </a:pPr>
+            <a:r>
+              <a:t>Top-K context -&gt; Prompt Builder -&gt; Local LLM</a:t>
+            </a:r>
+          </a:p>
+          <a:p>
+            <a:pPr>
+              <a:defRPr sz="2200"/>
+            </a:pPr>
+            <a:r>
+              <a:t>Answer + latency + retrieved chunks returned to UI</a:t>
+            </a:r>
+          </a:p>
+          <a:p>
+            <a:pPr>
+              <a:defRPr sz="2200"/>
+            </a:pPr>
+            <a:r>
+              <a:t>Ingestion pipeline builds FAISS from your documents</a:t>
             </a:r>
           </a:p>
         </p:txBody>
@@ -3451,63 +3382,133 @@
           <a:lstStyle/>
           <a:p>
             <a:r>
-              <a:t>Technology Stack</a:t>
-            </a:r>
-          </a:p>
-        </p:txBody>
-      </p:sp>
-      <p:sp>
-        <p:nvSpPr>
-          <p:cNvPr id="3" name="Content Placeholder 2"/>
-          <p:cNvSpPr>
-            <a:spLocks noGrp="1"/>
-          </p:cNvSpPr>
-          <p:nvPr>
-            <p:ph idx="1"/>
-          </p:nvPr>
-        </p:nvSpPr>
-        <p:spPr/>
-        <p:txBody>
-          <a:bodyPr/>
-          <a:lstStyle/>
-          <a:p>
-            <a:pPr>
-              <a:defRPr sz="2200"/>
-            </a:pPr>
-            <a:r>
-              <a:t>Python, FastAPI</a:t>
-            </a:r>
-          </a:p>
-          <a:p>
-            <a:pPr>
-              <a:defRPr sz="2200"/>
-            </a:pPr>
-            <a:r>
-              <a:t>Sentence Transformers (embeddings)</a:t>
-            </a:r>
-          </a:p>
-          <a:p>
-            <a:pPr>
-              <a:defRPr sz="2200"/>
-            </a:pPr>
-            <a:r>
-              <a:t>FAISS (vector database)</a:t>
-            </a:r>
-          </a:p>
-          <a:p>
-            <a:pPr>
-              <a:defRPr sz="2200"/>
-            </a:pPr>
-            <a:r>
-              <a:t>Transformers (generator model)</a:t>
-            </a:r>
-          </a:p>
-          <a:p>
-            <a:pPr>
-              <a:defRPr sz="2200"/>
-            </a:pPr>
-            <a:r>
-              <a:t>Docker + AWS EC2 / Azure VM</a:t>
+              <a:t>Baseline vs RAG</a:t>
+            </a:r>
+          </a:p>
+        </p:txBody>
+      </p:sp>
+      <p:sp>
+        <p:nvSpPr>
+          <p:cNvPr id="3" name="TextBox 2"/>
+          <p:cNvSpPr txBox="1"/>
+          <p:nvPr/>
+        </p:nvSpPr>
+        <p:spPr>
+          <a:xfrm>
+            <a:off x="548640" y="1463040"/>
+            <a:ext cx="5486400" cy="4389120"/>
+          </a:xfrm>
+          <a:prstGeom prst="rect">
+            <a:avLst/>
+          </a:prstGeom>
+          <a:noFill/>
+        </p:spPr>
+        <p:txBody>
+          <a:bodyPr wrap="none">
+            <a:spAutoFit/>
+          </a:bodyPr>
+          <a:lstStyle/>
+          <a:p>
+            <a:pPr>
+              <a:defRPr b="1" sz="2400"/>
+            </a:pPr>
+            <a:r>
+              <a:t>Baseline LLM</a:t>
+            </a:r>
+          </a:p>
+          <a:p>
+            <a:pPr>
+              <a:defRPr sz="2000"/>
+            </a:pPr>
+            <a:r>
+              <a:t>Direct question to model</a:t>
+            </a:r>
+          </a:p>
+          <a:p>
+            <a:pPr>
+              <a:defRPr sz="2000"/>
+            </a:pPr>
+            <a:r>
+              <a:t>No external evidence grounding</a:t>
+            </a:r>
+          </a:p>
+          <a:p>
+            <a:pPr>
+              <a:defRPr sz="2000"/>
+            </a:pPr>
+            <a:r>
+              <a:t>Lower latency</a:t>
+            </a:r>
+          </a:p>
+          <a:p>
+            <a:pPr>
+              <a:defRPr sz="2000"/>
+            </a:pPr>
+            <a:r>
+              <a:t>Higher hallucination risk</a:t>
+            </a:r>
+          </a:p>
+        </p:txBody>
+      </p:sp>
+      <p:sp>
+        <p:nvSpPr>
+          <p:cNvPr id="4" name="TextBox 3"/>
+          <p:cNvSpPr txBox="1"/>
+          <p:nvPr/>
+        </p:nvSpPr>
+        <p:spPr>
+          <a:xfrm>
+            <a:off x="6217920" y="1463040"/>
+            <a:ext cx="5486400" cy="4389120"/>
+          </a:xfrm>
+          <a:prstGeom prst="rect">
+            <a:avLst/>
+          </a:prstGeom>
+          <a:noFill/>
+        </p:spPr>
+        <p:txBody>
+          <a:bodyPr wrap="none">
+            <a:spAutoFit/>
+          </a:bodyPr>
+          <a:lstStyle/>
+          <a:p>
+            <a:pPr>
+              <a:defRPr b="1" sz="2400"/>
+            </a:pPr>
+            <a:r>
+              <a:t>RAG LLM</a:t>
+            </a:r>
+          </a:p>
+          <a:p>
+            <a:pPr>
+              <a:defRPr sz="2000"/>
+            </a:pPr>
+            <a:r>
+              <a:t>Retrieves relevant evidence</a:t>
+            </a:r>
+          </a:p>
+          <a:p>
+            <a:pPr>
+              <a:defRPr sz="2000"/>
+            </a:pPr>
+            <a:r>
+              <a:t>Context-grounded answer generation</a:t>
+            </a:r>
+          </a:p>
+          <a:p>
+            <a:pPr>
+              <a:defRPr sz="2000"/>
+            </a:pPr>
+            <a:r>
+              <a:t>Slight latency overhead</a:t>
+            </a:r>
+          </a:p>
+          <a:p>
+            <a:pPr>
+              <a:defRPr sz="2000"/>
+            </a:pPr>
+            <a:r>
+              <a:t>Better factual reliability</a:t>
             </a:r>
           </a:p>
         </p:txBody>
@@ -3546,7 +3547,7 @@
           <a:lstStyle/>
           <a:p>
             <a:r>
-              <a:t>Model Execution Mode</a:t>
+              <a:t>Technology Stack</a:t>
             </a:r>
           </a:p>
         </p:txBody>
@@ -3570,31 +3571,39 @@
               <a:defRPr sz="2200"/>
             </a:pPr>
             <a:r>
-              <a:t>Current implementation uses local models only</a:t>
-            </a:r>
-          </a:p>
-          <a:p>
-            <a:pPr>
-              <a:defRPr sz="2200"/>
-            </a:pPr>
-            <a:r>
-              <a:t>No OpenAI API key is required for this submission</a:t>
-            </a:r>
-          </a:p>
-          <a:p>
-            <a:pPr>
-              <a:defRPr sz="2200"/>
-            </a:pPr>
-            <a:r>
-              <a:t>Offline mock mode is available for restricted environments</a:t>
-            </a:r>
-          </a:p>
-          <a:p>
-            <a:pPr>
-              <a:defRPr sz="2200"/>
-            </a:pPr>
-            <a:r>
-              <a:t>OpenAI integration can be added later as future scope</a:t>
+              <a:t>Python, FastAPI</a:t>
+            </a:r>
+          </a:p>
+          <a:p>
+            <a:pPr>
+              <a:defRPr sz="2200"/>
+            </a:pPr>
+            <a:r>
+              <a:t>Sentence Transformers (embeddings)</a:t>
+            </a:r>
+          </a:p>
+          <a:p>
+            <a:pPr>
+              <a:defRPr sz="2200"/>
+            </a:pPr>
+            <a:r>
+              <a:t>FAISS (vector database)</a:t>
+            </a:r>
+          </a:p>
+          <a:p>
+            <a:pPr>
+              <a:defRPr sz="2200"/>
+            </a:pPr>
+            <a:r>
+              <a:t>Transformers (generator model)</a:t>
+            </a:r>
+          </a:p>
+          <a:p>
+            <a:pPr>
+              <a:defRPr sz="2200"/>
+            </a:pPr>
+            <a:r>
+              <a:t>Docker + AWS EC2 / Azure VM</a:t>
             </a:r>
           </a:p>
         </p:txBody>
@@ -3633,7 +3642,7 @@
           <a:lstStyle/>
           <a:p>
             <a:r>
-              <a:t>Experimental Strategy</a:t>
+              <a:t>Model Execution Mode</a:t>
             </a:r>
           </a:p>
         </p:txBody>
@@ -3657,31 +3666,31 @@
               <a:defRPr sz="2200"/>
             </a:pPr>
             <a:r>
-              <a:t>Experiment 1: Baseline LLM</a:t>
-            </a:r>
-          </a:p>
-          <a:p>
-            <a:pPr>
-              <a:defRPr sz="2200"/>
-            </a:pPr>
-            <a:r>
-              <a:t>Experiment 2: Basic RAG</a:t>
-            </a:r>
-          </a:p>
-          <a:p>
-            <a:pPr>
-              <a:defRPr sz="2200"/>
-            </a:pPr>
-            <a:r>
-              <a:t>Experiment 3: Optimized RAG</a:t>
-            </a:r>
-          </a:p>
-          <a:p>
-            <a:pPr>
-              <a:defRPr sz="2200"/>
-            </a:pPr>
-            <a:r>
-              <a:t>Compare quality and latency across all setups</a:t>
+              <a:t>Current implementation uses local models only</a:t>
+            </a:r>
+          </a:p>
+          <a:p>
+            <a:pPr>
+              <a:defRPr sz="2200"/>
+            </a:pPr>
+            <a:r>
+              <a:t>No OpenAI API key is required for this submission</a:t>
+            </a:r>
+          </a:p>
+          <a:p>
+            <a:pPr>
+              <a:defRPr sz="2200"/>
+            </a:pPr>
+            <a:r>
+              <a:t>Offline mock mode is available for restricted environments</a:t>
+            </a:r>
+          </a:p>
+          <a:p>
+            <a:pPr>
+              <a:defRPr sz="2200"/>
+            </a:pPr>
+            <a:r>
+              <a:t>OpenAI integration can be added later as future scope</a:t>
             </a:r>
           </a:p>
         </p:txBody>
@@ -3720,7 +3729,7 @@
           <a:lstStyle/>
           <a:p>
             <a:r>
-              <a:t>Evaluation Metrics</a:t>
+              <a:t>Experimental Strategy</a:t>
             </a:r>
           </a:p>
         </p:txBody>
@@ -3744,31 +3753,31 @@
               <a:defRPr sz="2200"/>
             </a:pPr>
             <a:r>
-              <a:t>Hallucination Rate (proxy)</a:t>
-            </a:r>
-          </a:p>
-          <a:p>
-            <a:pPr>
-              <a:defRPr sz="2200"/>
-            </a:pPr>
-            <a:r>
-              <a:t>Factual Accuracy (proxy)</a:t>
-            </a:r>
-          </a:p>
-          <a:p>
-            <a:pPr>
-              <a:defRPr sz="2200"/>
-            </a:pPr>
-            <a:r>
-              <a:t>Precision@K and Recall@K (retrieval quality)</a:t>
-            </a:r>
-          </a:p>
-          <a:p>
-            <a:pPr>
-              <a:defRPr sz="2200"/>
-            </a:pPr>
-            <a:r>
-              <a:t>Latency (ms) and computational cost</a:t>
+              <a:t>Experiment 1: Baseline LLM</a:t>
+            </a:r>
+          </a:p>
+          <a:p>
+            <a:pPr>
+              <a:defRPr sz="2200"/>
+            </a:pPr>
+            <a:r>
+              <a:t>Experiment 2: Basic RAG</a:t>
+            </a:r>
+          </a:p>
+          <a:p>
+            <a:pPr>
+              <a:defRPr sz="2200"/>
+            </a:pPr>
+            <a:r>
+              <a:t>Experiment 3: Optimized RAG</a:t>
+            </a:r>
+          </a:p>
+          <a:p>
+            <a:pPr>
+              <a:defRPr sz="2200"/>
+            </a:pPr>
+            <a:r>
+              <a:t>Compare quality and latency across all setups</a:t>
             </a:r>
           </a:p>
         </p:txBody>
@@ -3807,7 +3816,7 @@
           <a:lstStyle/>
           <a:p>
             <a:r>
-              <a:t>Implementation Deliverables</a:t>
+              <a:t>Evaluation Metrics</a:t>
             </a:r>
           </a:p>
         </p:txBody>
@@ -3831,39 +3840,31 @@
               <a:defRPr sz="2200"/>
             </a:pPr>
             <a:r>
-              <a:t>Document ingestion script</a:t>
-            </a:r>
-          </a:p>
-          <a:p>
-            <a:pPr>
-              <a:defRPr sz="2200"/>
-            </a:pPr>
-            <a:r>
-              <a:t>FAISS indexing pipeline</a:t>
-            </a:r>
-          </a:p>
-          <a:p>
-            <a:pPr>
-              <a:defRPr sz="2200"/>
-            </a:pPr>
-            <a:r>
-              <a:t>API endpoint for baseline and RAG queries</a:t>
-            </a:r>
-          </a:p>
-          <a:p>
-            <a:pPr>
-              <a:defRPr sz="2200"/>
-            </a:pPr>
-            <a:r>
-              <a:t>Experiment runner with JSON result output</a:t>
-            </a:r>
-          </a:p>
-          <a:p>
-            <a:pPr>
-              <a:defRPr sz="2200"/>
-            </a:pPr>
-            <a:r>
-              <a:t>Dockerized cloud deployment setup</a:t>
+              <a:t>Hallucination Rate (proxy)</a:t>
+            </a:r>
+          </a:p>
+          <a:p>
+            <a:pPr>
+              <a:defRPr sz="2200"/>
+            </a:pPr>
+            <a:r>
+              <a:t>Factual Accuracy (proxy)</a:t>
+            </a:r>
+          </a:p>
+          <a:p>
+            <a:pPr>
+              <a:defRPr sz="2200"/>
+            </a:pPr>
+            <a:r>
+              <a:t>Precision@K and Recall@K (retrieval quality)</a:t>
+            </a:r>
+          </a:p>
+          <a:p>
+            <a:pPr>
+              <a:defRPr sz="2200"/>
+            </a:pPr>
+            <a:r>
+              <a:t>Latency (ms) and computational cost</a:t>
             </a:r>
           </a:p>
         </p:txBody>
@@ -3877,6 +3878,101 @@
 </file>
 
 <file path=ppt/slides/slide17.xml><?xml version="1.0" encoding="utf-8"?>
+<p:sld xmlns:a="http://schemas.openxmlformats.org/drawingml/2006/main" xmlns:p="http://schemas.openxmlformats.org/presentationml/2006/main" xmlns:r="http://schemas.openxmlformats.org/officeDocument/2006/relationships">
+  <p:cSld>
+    <p:spTree>
+      <p:nvGrpSpPr>
+        <p:cNvPr id="1" name=""/>
+        <p:cNvGrpSpPr/>
+        <p:nvPr/>
+      </p:nvGrpSpPr>
+      <p:grpSpPr/>
+      <p:sp>
+        <p:nvSpPr>
+          <p:cNvPr id="2" name="Title 1"/>
+          <p:cNvSpPr>
+            <a:spLocks noGrp="1"/>
+          </p:cNvSpPr>
+          <p:nvPr>
+            <p:ph type="title"/>
+          </p:nvPr>
+        </p:nvSpPr>
+        <p:spPr/>
+        <p:txBody>
+          <a:bodyPr/>
+          <a:lstStyle/>
+          <a:p>
+            <a:r>
+              <a:t>Implementation Deliverables</a:t>
+            </a:r>
+          </a:p>
+        </p:txBody>
+      </p:sp>
+      <p:sp>
+        <p:nvSpPr>
+          <p:cNvPr id="3" name="Content Placeholder 2"/>
+          <p:cNvSpPr>
+            <a:spLocks noGrp="1"/>
+          </p:cNvSpPr>
+          <p:nvPr>
+            <p:ph idx="1"/>
+          </p:nvPr>
+        </p:nvSpPr>
+        <p:spPr/>
+        <p:txBody>
+          <a:bodyPr/>
+          <a:lstStyle/>
+          <a:p>
+            <a:pPr>
+              <a:defRPr sz="2200"/>
+            </a:pPr>
+            <a:r>
+              <a:t>Document ingestion script</a:t>
+            </a:r>
+          </a:p>
+          <a:p>
+            <a:pPr>
+              <a:defRPr sz="2200"/>
+            </a:pPr>
+            <a:r>
+              <a:t>FAISS indexing pipeline</a:t>
+            </a:r>
+          </a:p>
+          <a:p>
+            <a:pPr>
+              <a:defRPr sz="2200"/>
+            </a:pPr>
+            <a:r>
+              <a:t>API endpoint for baseline and RAG queries</a:t>
+            </a:r>
+          </a:p>
+          <a:p>
+            <a:pPr>
+              <a:defRPr sz="2200"/>
+            </a:pPr>
+            <a:r>
+              <a:t>Experiment runner with JSON result output</a:t>
+            </a:r>
+          </a:p>
+          <a:p>
+            <a:pPr>
+              <a:defRPr sz="2200"/>
+            </a:pPr>
+            <a:r>
+              <a:t>Dockerized cloud deployment setup</a:t>
+            </a:r>
+          </a:p>
+        </p:txBody>
+      </p:sp>
+    </p:spTree>
+  </p:cSld>
+  <p:clrMapOvr>
+    <a:masterClrMapping/>
+  </p:clrMapOvr>
+</p:sld>
+</file>
+
+<file path=ppt/slides/slide18.xml><?xml version="1.0" encoding="utf-8"?>
 <p:sld xmlns:a="http://schemas.openxmlformats.org/drawingml/2006/main" xmlns:p="http://schemas.openxmlformats.org/presentationml/2006/main" xmlns:r="http://schemas.openxmlformats.org/officeDocument/2006/relationships">
   <p:cSld>
     <p:spTree>
@@ -3970,7 +4066,7 @@
 </p:sld>
 </file>
 
-<file path=ppt/slides/slide18.xml><?xml version="1.0" encoding="utf-8"?>
+<file path=ppt/slides/slide19.xml><?xml version="1.0" encoding="utf-8"?>
 <p:sld xmlns:a="http://schemas.openxmlformats.org/drawingml/2006/main" xmlns:p="http://schemas.openxmlformats.org/presentationml/2006/main" xmlns:r="http://schemas.openxmlformats.org/officeDocument/2006/relationships">
   <p:cSld>
     <p:spTree>
@@ -4064,109 +4160,6 @@
 </p:sld>
 </file>
 
-<file path=ppt/slides/slide19.xml><?xml version="1.0" encoding="utf-8"?>
-<p:sld xmlns:a="http://schemas.openxmlformats.org/drawingml/2006/main" xmlns:p="http://schemas.openxmlformats.org/presentationml/2006/main" xmlns:r="http://schemas.openxmlformats.org/officeDocument/2006/relationships">
-  <p:cSld>
-    <p:spTree>
-      <p:nvGrpSpPr>
-        <p:cNvPr id="1" name=""/>
-        <p:cNvGrpSpPr/>
-        <p:nvPr/>
-      </p:nvGrpSpPr>
-      <p:grpSpPr/>
-      <p:sp>
-        <p:nvSpPr>
-          <p:cNvPr id="2" name="Title 1"/>
-          <p:cNvSpPr>
-            <a:spLocks noGrp="1"/>
-          </p:cNvSpPr>
-          <p:nvPr>
-            <p:ph type="title"/>
-          </p:nvPr>
-        </p:nvSpPr>
-        <p:spPr/>
-        <p:txBody>
-          <a:bodyPr/>
-          <a:lstStyle/>
-          <a:p>
-            <a:r>
-              <a:t>Six-Month Timeline</a:t>
-            </a:r>
-          </a:p>
-        </p:txBody>
-      </p:sp>
-      <p:sp>
-        <p:nvSpPr>
-          <p:cNvPr id="3" name="Content Placeholder 2"/>
-          <p:cNvSpPr>
-            <a:spLocks noGrp="1"/>
-          </p:cNvSpPr>
-          <p:nvPr>
-            <p:ph idx="1"/>
-          </p:nvPr>
-        </p:nvSpPr>
-        <p:spPr/>
-        <p:txBody>
-          <a:bodyPr/>
-          <a:lstStyle/>
-          <a:p>
-            <a:pPr>
-              <a:defRPr sz="2200"/>
-            </a:pPr>
-            <a:r>
-              <a:t>Month 1: Fundamentals + literature review</a:t>
-            </a:r>
-          </a:p>
-          <a:p>
-            <a:pPr>
-              <a:defRPr sz="2200"/>
-            </a:pPr>
-            <a:r>
-              <a:t>Month 2: Ingestion and indexing</a:t>
-            </a:r>
-          </a:p>
-          <a:p>
-            <a:pPr>
-              <a:defRPr sz="2200"/>
-            </a:pPr>
-            <a:r>
-              <a:t>Month 3: Baseline + RAG implementation</a:t>
-            </a:r>
-          </a:p>
-          <a:p>
-            <a:pPr>
-              <a:defRPr sz="2200"/>
-            </a:pPr>
-            <a:r>
-              <a:t>Month 4: Evaluation module and tuning</a:t>
-            </a:r>
-          </a:p>
-          <a:p>
-            <a:pPr>
-              <a:defRPr sz="2200"/>
-            </a:pPr>
-            <a:r>
-              <a:t>Month 5: Cloud deployment and full testing</a:t>
-            </a:r>
-          </a:p>
-          <a:p>
-            <a:pPr>
-              <a:defRPr sz="2200"/>
-            </a:pPr>
-            <a:r>
-              <a:t>Month 6: Final experiments + dissertation + viva</a:t>
-            </a:r>
-          </a:p>
-        </p:txBody>
-      </p:sp>
-    </p:spTree>
-  </p:cSld>
-  <p:clrMapOvr>
-    <a:masterClrMapping/>
-  </p:clrMapOvr>
-</p:sld>
-</file>
-
 <file path=ppt/slides/slide2.xml><?xml version="1.0" encoding="utf-8"?>
 <p:sld xmlns:a="http://schemas.openxmlformats.org/drawingml/2006/main" xmlns:p="http://schemas.openxmlformats.org/presentationml/2006/main" xmlns:r="http://schemas.openxmlformats.org/officeDocument/2006/relationships">
   <p:cSld>
@@ -4296,7 +4289,7 @@
           <a:lstStyle/>
           <a:p>
             <a:r>
-              <a:t>Risks and Mitigation</a:t>
+              <a:t>Six-Month Timeline</a:t>
             </a:r>
           </a:p>
         </p:txBody>
@@ -4320,31 +4313,47 @@
               <a:defRPr sz="2200"/>
             </a:pPr>
             <a:r>
-              <a:t>Data quality risk -&gt; source validation</a:t>
-            </a:r>
-          </a:p>
-          <a:p>
-            <a:pPr>
-              <a:defRPr sz="2200"/>
-            </a:pPr>
-            <a:r>
-              <a:t>Model/runtime limits -&gt; lighter model fallback</a:t>
-            </a:r>
-          </a:p>
-          <a:p>
-            <a:pPr>
-              <a:defRPr sz="2200"/>
-            </a:pPr>
-            <a:r>
-              <a:t>Cloud security risk -&gt; least privilege and TLS</a:t>
-            </a:r>
-          </a:p>
-          <a:p>
-            <a:pPr>
-              <a:defRPr sz="2200"/>
-            </a:pPr>
-            <a:r>
-              <a:t>Schedule overrun -&gt; weekly milestone tracking</a:t>
+              <a:t>Month 1: Fundamentals + literature review</a:t>
+            </a:r>
+          </a:p>
+          <a:p>
+            <a:pPr>
+              <a:defRPr sz="2200"/>
+            </a:pPr>
+            <a:r>
+              <a:t>Month 2: Ingestion and indexing</a:t>
+            </a:r>
+          </a:p>
+          <a:p>
+            <a:pPr>
+              <a:defRPr sz="2200"/>
+            </a:pPr>
+            <a:r>
+              <a:t>Month 3: Baseline + RAG implementation</a:t>
+            </a:r>
+          </a:p>
+          <a:p>
+            <a:pPr>
+              <a:defRPr sz="2200"/>
+            </a:pPr>
+            <a:r>
+              <a:t>Month 4: Evaluation module and tuning</a:t>
+            </a:r>
+          </a:p>
+          <a:p>
+            <a:pPr>
+              <a:defRPr sz="2200"/>
+            </a:pPr>
+            <a:r>
+              <a:t>Month 5: Cloud deployment and full testing</a:t>
+            </a:r>
+          </a:p>
+          <a:p>
+            <a:pPr>
+              <a:defRPr sz="2200"/>
+            </a:pPr>
+            <a:r>
+              <a:t>Month 6: Final experiments + dissertation + viva</a:t>
             </a:r>
           </a:p>
         </p:txBody>
@@ -4383,7 +4392,7 @@
           <a:lstStyle/>
           <a:p>
             <a:r>
-              <a:t>Expected Outcomes</a:t>
+              <a:t>Risks and Mitigation</a:t>
             </a:r>
           </a:p>
         </p:txBody>
@@ -4407,31 +4416,31 @@
               <a:defRPr sz="2200"/>
             </a:pPr>
             <a:r>
-              <a:t>Measured reduction in hallucination with RAG</a:t>
-            </a:r>
-          </a:p>
-          <a:p>
-            <a:pPr>
-              <a:defRPr sz="2200"/>
-            </a:pPr>
-            <a:r>
-              <a:t>Improved factual grounding and answer trustworthiness</a:t>
-            </a:r>
-          </a:p>
-          <a:p>
-            <a:pPr>
-              <a:defRPr sz="2200"/>
-            </a:pPr>
-            <a:r>
-              <a:t>Reproducible academic and technical artifacts</a:t>
-            </a:r>
-          </a:p>
-          <a:p>
-            <a:pPr>
-              <a:defRPr sz="2200"/>
-            </a:pPr>
-            <a:r>
-              <a:t>Practical guidance for enterprise AI assistants</a:t>
+              <a:t>Data quality risk -&gt; source validation</a:t>
+            </a:r>
+          </a:p>
+          <a:p>
+            <a:pPr>
+              <a:defRPr sz="2200"/>
+            </a:pPr>
+            <a:r>
+              <a:t>Model/runtime limits -&gt; lighter model fallback</a:t>
+            </a:r>
+          </a:p>
+          <a:p>
+            <a:pPr>
+              <a:defRPr sz="2200"/>
+            </a:pPr>
+            <a:r>
+              <a:t>Cloud security risk -&gt; least privilege and TLS</a:t>
+            </a:r>
+          </a:p>
+          <a:p>
+            <a:pPr>
+              <a:defRPr sz="2200"/>
+            </a:pPr>
+            <a:r>
+              <a:t>Schedule overrun -&gt; weekly milestone tracking</a:t>
             </a:r>
           </a:p>
         </p:txBody>
@@ -4470,7 +4479,7 @@
           <a:lstStyle/>
           <a:p>
             <a:r>
-              <a:t>Conclusion</a:t>
+              <a:t>Expected Outcomes</a:t>
             </a:r>
           </a:p>
         </p:txBody>
@@ -4494,31 +4503,31 @@
               <a:defRPr sz="2200"/>
             </a:pPr>
             <a:r>
-              <a:t>RAG is a practical method to improve factual reliability</a:t>
-            </a:r>
-          </a:p>
-          <a:p>
-            <a:pPr>
-              <a:defRPr sz="2200"/>
-            </a:pPr>
-            <a:r>
-              <a:t>This project combines engineering and experimental rigor</a:t>
-            </a:r>
-          </a:p>
-          <a:p>
-            <a:pPr>
-              <a:defRPr sz="2200"/>
-            </a:pPr>
-            <a:r>
-              <a:t>Framework is cloud-ready and reproducible</a:t>
-            </a:r>
-          </a:p>
-          <a:p>
-            <a:pPr>
-              <a:defRPr sz="2200"/>
-            </a:pPr>
-            <a:r>
-              <a:t>Future work: reranking, citation verification, human eval</a:t>
+              <a:t>Measured reduction in hallucination with RAG</a:t>
+            </a:r>
+          </a:p>
+          <a:p>
+            <a:pPr>
+              <a:defRPr sz="2200"/>
+            </a:pPr>
+            <a:r>
+              <a:t>Improved factual grounding and answer trustworthiness</a:t>
+            </a:r>
+          </a:p>
+          <a:p>
+            <a:pPr>
+              <a:defRPr sz="2200"/>
+            </a:pPr>
+            <a:r>
+              <a:t>Reproducible academic and technical artifacts</a:t>
+            </a:r>
+          </a:p>
+          <a:p>
+            <a:pPr>
+              <a:defRPr sz="2200"/>
+            </a:pPr>
+            <a:r>
+              <a:t>Practical guidance for enterprise AI assistants</a:t>
             </a:r>
           </a:p>
         </p:txBody>
@@ -4532,6 +4541,93 @@
 </file>
 
 <file path=ppt/slides/slide23.xml><?xml version="1.0" encoding="utf-8"?>
+<p:sld xmlns:a="http://schemas.openxmlformats.org/drawingml/2006/main" xmlns:p="http://schemas.openxmlformats.org/presentationml/2006/main" xmlns:r="http://schemas.openxmlformats.org/officeDocument/2006/relationships">
+  <p:cSld>
+    <p:spTree>
+      <p:nvGrpSpPr>
+        <p:cNvPr id="1" name=""/>
+        <p:cNvGrpSpPr/>
+        <p:nvPr/>
+      </p:nvGrpSpPr>
+      <p:grpSpPr/>
+      <p:sp>
+        <p:nvSpPr>
+          <p:cNvPr id="2" name="Title 1"/>
+          <p:cNvSpPr>
+            <a:spLocks noGrp="1"/>
+          </p:cNvSpPr>
+          <p:nvPr>
+            <p:ph type="title"/>
+          </p:nvPr>
+        </p:nvSpPr>
+        <p:spPr/>
+        <p:txBody>
+          <a:bodyPr/>
+          <a:lstStyle/>
+          <a:p>
+            <a:r>
+              <a:t>Conclusion</a:t>
+            </a:r>
+          </a:p>
+        </p:txBody>
+      </p:sp>
+      <p:sp>
+        <p:nvSpPr>
+          <p:cNvPr id="3" name="Content Placeholder 2"/>
+          <p:cNvSpPr>
+            <a:spLocks noGrp="1"/>
+          </p:cNvSpPr>
+          <p:nvPr>
+            <p:ph idx="1"/>
+          </p:nvPr>
+        </p:nvSpPr>
+        <p:spPr/>
+        <p:txBody>
+          <a:bodyPr/>
+          <a:lstStyle/>
+          <a:p>
+            <a:pPr>
+              <a:defRPr sz="2200"/>
+            </a:pPr>
+            <a:r>
+              <a:t>RAG is a practical method to improve factual reliability</a:t>
+            </a:r>
+          </a:p>
+          <a:p>
+            <a:pPr>
+              <a:defRPr sz="2200"/>
+            </a:pPr>
+            <a:r>
+              <a:t>This project combines engineering and experimental rigor</a:t>
+            </a:r>
+          </a:p>
+          <a:p>
+            <a:pPr>
+              <a:defRPr sz="2200"/>
+            </a:pPr>
+            <a:r>
+              <a:t>Framework is cloud-ready and reproducible</a:t>
+            </a:r>
+          </a:p>
+          <a:p>
+            <a:pPr>
+              <a:defRPr sz="2200"/>
+            </a:pPr>
+            <a:r>
+              <a:t>Future work: reranking, citation verification, human eval</a:t>
+            </a:r>
+          </a:p>
+        </p:txBody>
+      </p:sp>
+    </p:spTree>
+  </p:cSld>
+  <p:clrMapOvr>
+    <a:masterClrMapping/>
+  </p:clrMapOvr>
+</p:sld>
+</file>
+
+<file path=ppt/slides/slide24.xml><?xml version="1.0" encoding="utf-8"?>
 <p:sld xmlns:a="http://schemas.openxmlformats.org/drawingml/2006/main" xmlns:p="http://schemas.openxmlformats.org/presentationml/2006/main" xmlns:r="http://schemas.openxmlformats.org/officeDocument/2006/relationships">
   <p:cSld>
     <p:spTree>

</xml_diff>

<commit_message>
Generate DOCX submission file and resize PPT to 19 slides with screenshots last
</commit_message>
<xml_diff>
--- a/docs/MSc_RAG_Project_Vels_University.pptx
+++ b/docs/MSc_RAG_Project_Vels_University.pptx
@@ -24,11 +24,6 @@
     <p:sldId id="272" r:id="rId23"/>
     <p:sldId id="273" r:id="rId24"/>
     <p:sldId id="274" r:id="rId25"/>
-    <p:sldId id="275" r:id="rId26"/>
-    <p:sldId id="276" r:id="rId27"/>
-    <p:sldId id="277" r:id="rId28"/>
-    <p:sldId id="278" r:id="rId29"/>
-    <p:sldId id="279" r:id="rId30"/>
   </p:sldIdLst>
   <p:sldSz cx="9144000" cy="6858000" type="screen4x3"/>
   <p:notesSz cx="6858000" cy="9144000"/>
@@ -3192,63 +3187,133 @@
           <a:lstStyle/>
           <a:p>
             <a:r>
-              <a:t>System Architecture</a:t>
-            </a:r>
-          </a:p>
-        </p:txBody>
-      </p:sp>
-      <p:sp>
-        <p:nvSpPr>
-          <p:cNvPr id="3" name="Content Placeholder 2"/>
-          <p:cNvSpPr>
-            <a:spLocks noGrp="1"/>
-          </p:cNvSpPr>
-          <p:nvPr>
-            <p:ph idx="1"/>
-          </p:nvPr>
-        </p:nvSpPr>
-        <p:spPr/>
-        <p:txBody>
-          <a:bodyPr/>
-          <a:lstStyle/>
-          <a:p>
-            <a:pPr>
-              <a:defRPr sz="2200"/>
-            </a:pPr>
-            <a:r>
-              <a:t>User -&gt; FastAPI API Layer</a:t>
-            </a:r>
-          </a:p>
-          <a:p>
-            <a:pPr>
-              <a:defRPr sz="2200"/>
-            </a:pPr>
-            <a:r>
-              <a:t>Query Encoder -&gt; FAISS Vector Search</a:t>
-            </a:r>
-          </a:p>
-          <a:p>
-            <a:pPr>
-              <a:defRPr sz="2200"/>
-            </a:pPr>
-            <a:r>
-              <a:t>Top-k Context Retrieval</a:t>
-            </a:r>
-          </a:p>
-          <a:p>
-            <a:pPr>
-              <a:defRPr sz="2200"/>
-            </a:pPr>
-            <a:r>
-              <a:t>Prompt Builder -&gt; LLM Generator</a:t>
-            </a:r>
-          </a:p>
-          <a:p>
-            <a:pPr>
-              <a:defRPr sz="2200"/>
-            </a:pPr>
-            <a:r>
-              <a:t>Evaluation Module -&gt; Response + Metrics</a:t>
+              <a:t>Baseline vs RAG</a:t>
+            </a:r>
+          </a:p>
+        </p:txBody>
+      </p:sp>
+      <p:sp>
+        <p:nvSpPr>
+          <p:cNvPr id="3" name="TextBox 2"/>
+          <p:cNvSpPr txBox="1"/>
+          <p:nvPr/>
+        </p:nvSpPr>
+        <p:spPr>
+          <a:xfrm>
+            <a:off x="548640" y="1463040"/>
+            <a:ext cx="5486400" cy="4389120"/>
+          </a:xfrm>
+          <a:prstGeom prst="rect">
+            <a:avLst/>
+          </a:prstGeom>
+          <a:noFill/>
+        </p:spPr>
+        <p:txBody>
+          <a:bodyPr wrap="none">
+            <a:spAutoFit/>
+          </a:bodyPr>
+          <a:lstStyle/>
+          <a:p>
+            <a:pPr>
+              <a:defRPr b="1" sz="2400"/>
+            </a:pPr>
+            <a:r>
+              <a:t>Baseline LLM</a:t>
+            </a:r>
+          </a:p>
+          <a:p>
+            <a:pPr>
+              <a:defRPr sz="2000"/>
+            </a:pPr>
+            <a:r>
+              <a:t>Direct question to model</a:t>
+            </a:r>
+          </a:p>
+          <a:p>
+            <a:pPr>
+              <a:defRPr sz="2000"/>
+            </a:pPr>
+            <a:r>
+              <a:t>No external evidence grounding</a:t>
+            </a:r>
+          </a:p>
+          <a:p>
+            <a:pPr>
+              <a:defRPr sz="2000"/>
+            </a:pPr>
+            <a:r>
+              <a:t>Lower latency</a:t>
+            </a:r>
+          </a:p>
+          <a:p>
+            <a:pPr>
+              <a:defRPr sz="2000"/>
+            </a:pPr>
+            <a:r>
+              <a:t>Higher hallucination risk</a:t>
+            </a:r>
+          </a:p>
+        </p:txBody>
+      </p:sp>
+      <p:sp>
+        <p:nvSpPr>
+          <p:cNvPr id="4" name="TextBox 3"/>
+          <p:cNvSpPr txBox="1"/>
+          <p:nvPr/>
+        </p:nvSpPr>
+        <p:spPr>
+          <a:xfrm>
+            <a:off x="6217920" y="1463040"/>
+            <a:ext cx="5486400" cy="4389120"/>
+          </a:xfrm>
+          <a:prstGeom prst="rect">
+            <a:avLst/>
+          </a:prstGeom>
+          <a:noFill/>
+        </p:spPr>
+        <p:txBody>
+          <a:bodyPr wrap="none">
+            <a:spAutoFit/>
+          </a:bodyPr>
+          <a:lstStyle/>
+          <a:p>
+            <a:pPr>
+              <a:defRPr b="1" sz="2400"/>
+            </a:pPr>
+            <a:r>
+              <a:t>RAG LLM</a:t>
+            </a:r>
+          </a:p>
+          <a:p>
+            <a:pPr>
+              <a:defRPr sz="2000"/>
+            </a:pPr>
+            <a:r>
+              <a:t>Retrieves relevant evidence</a:t>
+            </a:r>
+          </a:p>
+          <a:p>
+            <a:pPr>
+              <a:defRPr sz="2000"/>
+            </a:pPr>
+            <a:r>
+              <a:t>Context-grounded answer generation</a:t>
+            </a:r>
+          </a:p>
+          <a:p>
+            <a:pPr>
+              <a:defRPr sz="2000"/>
+            </a:pPr>
+            <a:r>
+              <a:t>Slight latency overhead</a:t>
+            </a:r>
+          </a:p>
+          <a:p>
+            <a:pPr>
+              <a:defRPr sz="2000"/>
+            </a:pPr>
+            <a:r>
+              <a:t>Better factual reliability</a:t>
             </a:r>
           </a:p>
         </p:txBody>
@@ -3287,7 +3352,7 @@
           <a:lstStyle/>
           <a:p>
             <a:r>
-              <a:t>Simple Architecture (Easy View)</a:t>
+              <a:t>Technology Stack</a:t>
             </a:r>
           </a:p>
         </p:txBody>
@@ -3311,39 +3376,39 @@
               <a:defRPr sz="2200"/>
             </a:pPr>
             <a:r>
-              <a:t>User/Web UI -&gt; FastAPI Backend</a:t>
-            </a:r>
-          </a:p>
-          <a:p>
-            <a:pPr>
-              <a:defRPr sz="2200"/>
-            </a:pPr>
-            <a:r>
-              <a:t>Backend -&gt; Retriever -&gt; FAISS Index</a:t>
-            </a:r>
-          </a:p>
-          <a:p>
-            <a:pPr>
-              <a:defRPr sz="2200"/>
-            </a:pPr>
-            <a:r>
-              <a:t>Top-K context -&gt; Prompt Builder -&gt; Local LLM</a:t>
-            </a:r>
-          </a:p>
-          <a:p>
-            <a:pPr>
-              <a:defRPr sz="2200"/>
-            </a:pPr>
-            <a:r>
-              <a:t>Answer + latency + retrieved chunks returned to UI</a:t>
-            </a:r>
-          </a:p>
-          <a:p>
-            <a:pPr>
-              <a:defRPr sz="2200"/>
-            </a:pPr>
-            <a:r>
-              <a:t>Ingestion pipeline builds FAISS from your documents</a:t>
+              <a:t>Python, FastAPI</a:t>
+            </a:r>
+          </a:p>
+          <a:p>
+            <a:pPr>
+              <a:defRPr sz="2200"/>
+            </a:pPr>
+            <a:r>
+              <a:t>Sentence Transformers (embeddings)</a:t>
+            </a:r>
+          </a:p>
+          <a:p>
+            <a:pPr>
+              <a:defRPr sz="2200"/>
+            </a:pPr>
+            <a:r>
+              <a:t>FAISS (vector database)</a:t>
+            </a:r>
+          </a:p>
+          <a:p>
+            <a:pPr>
+              <a:defRPr sz="2200"/>
+            </a:pPr>
+            <a:r>
+              <a:t>Transformers (generator model)</a:t>
+            </a:r>
+          </a:p>
+          <a:p>
+            <a:pPr>
+              <a:defRPr sz="2200"/>
+            </a:pPr>
+            <a:r>
+              <a:t>Docker + AWS EC2 / Azure VM</a:t>
             </a:r>
           </a:p>
         </p:txBody>
@@ -3382,133 +3447,55 @@
           <a:lstStyle/>
           <a:p>
             <a:r>
-              <a:t>Baseline vs RAG</a:t>
-            </a:r>
-          </a:p>
-        </p:txBody>
-      </p:sp>
-      <p:sp>
-        <p:nvSpPr>
-          <p:cNvPr id="3" name="TextBox 2"/>
-          <p:cNvSpPr txBox="1"/>
-          <p:nvPr/>
-        </p:nvSpPr>
-        <p:spPr>
-          <a:xfrm>
-            <a:off x="548640" y="1463040"/>
-            <a:ext cx="5486400" cy="4389120"/>
-          </a:xfrm>
-          <a:prstGeom prst="rect">
-            <a:avLst/>
-          </a:prstGeom>
-          <a:noFill/>
-        </p:spPr>
-        <p:txBody>
-          <a:bodyPr wrap="none">
-            <a:spAutoFit/>
-          </a:bodyPr>
-          <a:lstStyle/>
-          <a:p>
-            <a:pPr>
-              <a:defRPr b="1" sz="2400"/>
-            </a:pPr>
-            <a:r>
-              <a:t>Baseline LLM</a:t>
-            </a:r>
-          </a:p>
-          <a:p>
-            <a:pPr>
-              <a:defRPr sz="2000"/>
-            </a:pPr>
-            <a:r>
-              <a:t>Direct question to model</a:t>
-            </a:r>
-          </a:p>
-          <a:p>
-            <a:pPr>
-              <a:defRPr sz="2000"/>
-            </a:pPr>
-            <a:r>
-              <a:t>No external evidence grounding</a:t>
-            </a:r>
-          </a:p>
-          <a:p>
-            <a:pPr>
-              <a:defRPr sz="2000"/>
-            </a:pPr>
-            <a:r>
-              <a:t>Lower latency</a:t>
-            </a:r>
-          </a:p>
-          <a:p>
-            <a:pPr>
-              <a:defRPr sz="2000"/>
-            </a:pPr>
-            <a:r>
-              <a:t>Higher hallucination risk</a:t>
-            </a:r>
-          </a:p>
-        </p:txBody>
-      </p:sp>
-      <p:sp>
-        <p:nvSpPr>
-          <p:cNvPr id="4" name="TextBox 3"/>
-          <p:cNvSpPr txBox="1"/>
-          <p:nvPr/>
-        </p:nvSpPr>
-        <p:spPr>
-          <a:xfrm>
-            <a:off x="6217920" y="1463040"/>
-            <a:ext cx="5486400" cy="4389120"/>
-          </a:xfrm>
-          <a:prstGeom prst="rect">
-            <a:avLst/>
-          </a:prstGeom>
-          <a:noFill/>
-        </p:spPr>
-        <p:txBody>
-          <a:bodyPr wrap="none">
-            <a:spAutoFit/>
-          </a:bodyPr>
-          <a:lstStyle/>
-          <a:p>
-            <a:pPr>
-              <a:defRPr b="1" sz="2400"/>
-            </a:pPr>
-            <a:r>
-              <a:t>RAG LLM</a:t>
-            </a:r>
-          </a:p>
-          <a:p>
-            <a:pPr>
-              <a:defRPr sz="2000"/>
-            </a:pPr>
-            <a:r>
-              <a:t>Retrieves relevant evidence</a:t>
-            </a:r>
-          </a:p>
-          <a:p>
-            <a:pPr>
-              <a:defRPr sz="2000"/>
-            </a:pPr>
-            <a:r>
-              <a:t>Context-grounded answer generation</a:t>
-            </a:r>
-          </a:p>
-          <a:p>
-            <a:pPr>
-              <a:defRPr sz="2000"/>
-            </a:pPr>
-            <a:r>
-              <a:t>Slight latency overhead</a:t>
-            </a:r>
-          </a:p>
-          <a:p>
-            <a:pPr>
-              <a:defRPr sz="2000"/>
-            </a:pPr>
-            <a:r>
-              <a:t>Better factual reliability</a:t>
+              <a:t>Experimental Strategy</a:t>
+            </a:r>
+          </a:p>
+        </p:txBody>
+      </p:sp>
+      <p:sp>
+        <p:nvSpPr>
+          <p:cNvPr id="3" name="Content Placeholder 2"/>
+          <p:cNvSpPr>
+            <a:spLocks noGrp="1"/>
+          </p:cNvSpPr>
+          <p:nvPr>
+            <p:ph idx="1"/>
+          </p:nvPr>
+        </p:nvSpPr>
+        <p:spPr/>
+        <p:txBody>
+          <a:bodyPr/>
+          <a:lstStyle/>
+          <a:p>
+            <a:pPr>
+              <a:defRPr sz="2200"/>
+            </a:pPr>
+            <a:r>
+              <a:t>Experiment 1: Baseline LLM</a:t>
+            </a:r>
+          </a:p>
+          <a:p>
+            <a:pPr>
+              <a:defRPr sz="2200"/>
+            </a:pPr>
+            <a:r>
+              <a:t>Experiment 2: Basic RAG</a:t>
+            </a:r>
+          </a:p>
+          <a:p>
+            <a:pPr>
+              <a:defRPr sz="2200"/>
+            </a:pPr>
+            <a:r>
+              <a:t>Experiment 3: Optimized RAG</a:t>
+            </a:r>
+          </a:p>
+          <a:p>
+            <a:pPr>
+              <a:defRPr sz="2200"/>
+            </a:pPr>
+            <a:r>
+              <a:t>Compare quality and latency across all setups</a:t>
             </a:r>
           </a:p>
         </p:txBody>
@@ -3547,7 +3534,7 @@
           <a:lstStyle/>
           <a:p>
             <a:r>
-              <a:t>Technology Stack</a:t>
+              <a:t>Evaluation Metrics</a:t>
             </a:r>
           </a:p>
         </p:txBody>
@@ -3571,39 +3558,31 @@
               <a:defRPr sz="2200"/>
             </a:pPr>
             <a:r>
-              <a:t>Python, FastAPI</a:t>
-            </a:r>
-          </a:p>
-          <a:p>
-            <a:pPr>
-              <a:defRPr sz="2200"/>
-            </a:pPr>
-            <a:r>
-              <a:t>Sentence Transformers (embeddings)</a:t>
-            </a:r>
-          </a:p>
-          <a:p>
-            <a:pPr>
-              <a:defRPr sz="2200"/>
-            </a:pPr>
-            <a:r>
-              <a:t>FAISS (vector database)</a:t>
-            </a:r>
-          </a:p>
-          <a:p>
-            <a:pPr>
-              <a:defRPr sz="2200"/>
-            </a:pPr>
-            <a:r>
-              <a:t>Transformers (generator model)</a:t>
-            </a:r>
-          </a:p>
-          <a:p>
-            <a:pPr>
-              <a:defRPr sz="2200"/>
-            </a:pPr>
-            <a:r>
-              <a:t>Docker + AWS EC2 / Azure VM</a:t>
+              <a:t>Hallucination Rate (proxy)</a:t>
+            </a:r>
+          </a:p>
+          <a:p>
+            <a:pPr>
+              <a:defRPr sz="2200"/>
+            </a:pPr>
+            <a:r>
+              <a:t>Factual Accuracy (proxy)</a:t>
+            </a:r>
+          </a:p>
+          <a:p>
+            <a:pPr>
+              <a:defRPr sz="2200"/>
+            </a:pPr>
+            <a:r>
+              <a:t>Precision@K and Recall@K (retrieval quality)</a:t>
+            </a:r>
+          </a:p>
+          <a:p>
+            <a:pPr>
+              <a:defRPr sz="2200"/>
+            </a:pPr>
+            <a:r>
+              <a:t>Latency (ms) and computational cost</a:t>
             </a:r>
           </a:p>
         </p:txBody>
@@ -3642,7 +3621,7 @@
           <a:lstStyle/>
           <a:p>
             <a:r>
-              <a:t>Model Execution Mode</a:t>
+              <a:t>Six-Month Timeline</a:t>
             </a:r>
           </a:p>
         </p:txBody>
@@ -3666,31 +3645,47 @@
               <a:defRPr sz="2200"/>
             </a:pPr>
             <a:r>
-              <a:t>Current implementation uses local models only</a:t>
-            </a:r>
-          </a:p>
-          <a:p>
-            <a:pPr>
-              <a:defRPr sz="2200"/>
-            </a:pPr>
-            <a:r>
-              <a:t>No OpenAI API key is required for this submission</a:t>
-            </a:r>
-          </a:p>
-          <a:p>
-            <a:pPr>
-              <a:defRPr sz="2200"/>
-            </a:pPr>
-            <a:r>
-              <a:t>Offline mock mode is available for restricted environments</a:t>
-            </a:r>
-          </a:p>
-          <a:p>
-            <a:pPr>
-              <a:defRPr sz="2200"/>
-            </a:pPr>
-            <a:r>
-              <a:t>OpenAI integration can be added later as future scope</a:t>
+              <a:t>Month 1: Fundamentals + literature review</a:t>
+            </a:r>
+          </a:p>
+          <a:p>
+            <a:pPr>
+              <a:defRPr sz="2200"/>
+            </a:pPr>
+            <a:r>
+              <a:t>Month 2: Ingestion and indexing</a:t>
+            </a:r>
+          </a:p>
+          <a:p>
+            <a:pPr>
+              <a:defRPr sz="2200"/>
+            </a:pPr>
+            <a:r>
+              <a:t>Month 3: Baseline + RAG implementation</a:t>
+            </a:r>
+          </a:p>
+          <a:p>
+            <a:pPr>
+              <a:defRPr sz="2200"/>
+            </a:pPr>
+            <a:r>
+              <a:t>Month 4: Evaluation module and tuning</a:t>
+            </a:r>
+          </a:p>
+          <a:p>
+            <a:pPr>
+              <a:defRPr sz="2200"/>
+            </a:pPr>
+            <a:r>
+              <a:t>Month 5: Cloud deployment and full testing</a:t>
+            </a:r>
+          </a:p>
+          <a:p>
+            <a:pPr>
+              <a:defRPr sz="2200"/>
+            </a:pPr>
+            <a:r>
+              <a:t>Month 6: Final experiments + dissertation + viva</a:t>
             </a:r>
           </a:p>
         </p:txBody>
@@ -3729,7 +3724,7 @@
           <a:lstStyle/>
           <a:p>
             <a:r>
-              <a:t>Experimental Strategy</a:t>
+              <a:t>Risks and Mitigation</a:t>
             </a:r>
           </a:p>
         </p:txBody>
@@ -3753,31 +3748,31 @@
               <a:defRPr sz="2200"/>
             </a:pPr>
             <a:r>
-              <a:t>Experiment 1: Baseline LLM</a:t>
-            </a:r>
-          </a:p>
-          <a:p>
-            <a:pPr>
-              <a:defRPr sz="2200"/>
-            </a:pPr>
-            <a:r>
-              <a:t>Experiment 2: Basic RAG</a:t>
-            </a:r>
-          </a:p>
-          <a:p>
-            <a:pPr>
-              <a:defRPr sz="2200"/>
-            </a:pPr>
-            <a:r>
-              <a:t>Experiment 3: Optimized RAG</a:t>
-            </a:r>
-          </a:p>
-          <a:p>
-            <a:pPr>
-              <a:defRPr sz="2200"/>
-            </a:pPr>
-            <a:r>
-              <a:t>Compare quality and latency across all setups</a:t>
+              <a:t>Data quality risk -&gt; source validation</a:t>
+            </a:r>
+          </a:p>
+          <a:p>
+            <a:pPr>
+              <a:defRPr sz="2200"/>
+            </a:pPr>
+            <a:r>
+              <a:t>Model/runtime limits -&gt; lighter model fallback</a:t>
+            </a:r>
+          </a:p>
+          <a:p>
+            <a:pPr>
+              <a:defRPr sz="2200"/>
+            </a:pPr>
+            <a:r>
+              <a:t>Cloud security risk -&gt; least privilege and TLS</a:t>
+            </a:r>
+          </a:p>
+          <a:p>
+            <a:pPr>
+              <a:defRPr sz="2200"/>
+            </a:pPr>
+            <a:r>
+              <a:t>Schedule overrun -&gt; weekly milestone tracking</a:t>
             </a:r>
           </a:p>
         </p:txBody>
@@ -3816,7 +3811,7 @@
           <a:lstStyle/>
           <a:p>
             <a:r>
-              <a:t>Evaluation Metrics</a:t>
+              <a:t>Expected Outcomes</a:t>
             </a:r>
           </a:p>
         </p:txBody>
@@ -3840,31 +3835,31 @@
               <a:defRPr sz="2200"/>
             </a:pPr>
             <a:r>
-              <a:t>Hallucination Rate (proxy)</a:t>
-            </a:r>
-          </a:p>
-          <a:p>
-            <a:pPr>
-              <a:defRPr sz="2200"/>
-            </a:pPr>
-            <a:r>
-              <a:t>Factual Accuracy (proxy)</a:t>
-            </a:r>
-          </a:p>
-          <a:p>
-            <a:pPr>
-              <a:defRPr sz="2200"/>
-            </a:pPr>
-            <a:r>
-              <a:t>Precision@K and Recall@K (retrieval quality)</a:t>
-            </a:r>
-          </a:p>
-          <a:p>
-            <a:pPr>
-              <a:defRPr sz="2200"/>
-            </a:pPr>
-            <a:r>
-              <a:t>Latency (ms) and computational cost</a:t>
+              <a:t>Measured reduction in hallucination with RAG</a:t>
+            </a:r>
+          </a:p>
+          <a:p>
+            <a:pPr>
+              <a:defRPr sz="2200"/>
+            </a:pPr>
+            <a:r>
+              <a:t>Improved factual grounding and answer trustworthiness</a:t>
+            </a:r>
+          </a:p>
+          <a:p>
+            <a:pPr>
+              <a:defRPr sz="2200"/>
+            </a:pPr>
+            <a:r>
+              <a:t>Reproducible academic and technical artifacts</a:t>
+            </a:r>
+          </a:p>
+          <a:p>
+            <a:pPr>
+              <a:defRPr sz="2200"/>
+            </a:pPr>
+            <a:r>
+              <a:t>Practical guidance for enterprise AI assistants</a:t>
             </a:r>
           </a:p>
         </p:txBody>
@@ -3903,7 +3898,7 @@
           <a:lstStyle/>
           <a:p>
             <a:r>
-              <a:t>Implementation Deliverables</a:t>
+              <a:t>Conclusion</a:t>
             </a:r>
           </a:p>
         </p:txBody>
@@ -3927,39 +3922,31 @@
               <a:defRPr sz="2200"/>
             </a:pPr>
             <a:r>
-              <a:t>Document ingestion script</a:t>
-            </a:r>
-          </a:p>
-          <a:p>
-            <a:pPr>
-              <a:defRPr sz="2200"/>
-            </a:pPr>
-            <a:r>
-              <a:t>FAISS indexing pipeline</a:t>
-            </a:r>
-          </a:p>
-          <a:p>
-            <a:pPr>
-              <a:defRPr sz="2200"/>
-            </a:pPr>
-            <a:r>
-              <a:t>API endpoint for baseline and RAG queries</a:t>
-            </a:r>
-          </a:p>
-          <a:p>
-            <a:pPr>
-              <a:defRPr sz="2200"/>
-            </a:pPr>
-            <a:r>
-              <a:t>Experiment runner with JSON result output</a:t>
-            </a:r>
-          </a:p>
-          <a:p>
-            <a:pPr>
-              <a:defRPr sz="2200"/>
-            </a:pPr>
-            <a:r>
-              <a:t>Dockerized cloud deployment setup</a:t>
+              <a:t>RAG is a practical method to improve factual reliability</a:t>
+            </a:r>
+          </a:p>
+          <a:p>
+            <a:pPr>
+              <a:defRPr sz="2200"/>
+            </a:pPr>
+            <a:r>
+              <a:t>This project combines engineering and experimental rigor</a:t>
+            </a:r>
+          </a:p>
+          <a:p>
+            <a:pPr>
+              <a:defRPr sz="2200"/>
+            </a:pPr>
+            <a:r>
+              <a:t>Framework is cloud-ready and reproducible</a:t>
+            </a:r>
+          </a:p>
+          <a:p>
+            <a:pPr>
+              <a:defRPr sz="2200"/>
+            </a:pPr>
+            <a:r>
+              <a:t>Future work: reranking, citation verification, human eval</a:t>
             </a:r>
           </a:p>
         </p:txBody>
@@ -3998,62 +3985,47 @@
           <a:lstStyle/>
           <a:p>
             <a:r>
-              <a:t>Frontend UI Screenshot</a:t>
-            </a:r>
-          </a:p>
-        </p:txBody>
-      </p:sp>
-      <p:pic>
-        <p:nvPicPr>
-          <p:cNvPr id="3" name="Picture 2" descr="frontend_ui.png"/>
-          <p:cNvPicPr>
-            <a:picLocks noChangeAspect="1"/>
-          </p:cNvPicPr>
-          <p:nvPr/>
-        </p:nvPicPr>
-        <p:blipFill>
-          <a:blip r:embed="rId2"/>
-          <a:stretch>
-            <a:fillRect/>
-          </a:stretch>
-        </p:blipFill>
-        <p:spPr>
-          <a:xfrm>
-            <a:off x="548640" y="1188720"/>
-            <a:ext cx="11064240" cy="5120640"/>
-          </a:xfrm>
-          <a:prstGeom prst="rect">
-            <a:avLst/>
-          </a:prstGeom>
-        </p:spPr>
-      </p:pic>
-      <p:sp>
-        <p:nvSpPr>
-          <p:cNvPr id="4" name="TextBox 3"/>
-          <p:cNvSpPr txBox="1"/>
-          <p:nvPr/>
-        </p:nvSpPr>
-        <p:spPr>
-          <a:xfrm>
-            <a:off x="548640" y="6400800"/>
-            <a:ext cx="11064240" cy="457200"/>
-          </a:xfrm>
-          <a:prstGeom prst="rect">
-            <a:avLst/>
-          </a:prstGeom>
-          <a:noFill/>
-        </p:spPr>
-        <p:txBody>
-          <a:bodyPr wrap="none">
-            <a:spAutoFit/>
-          </a:bodyPr>
-          <a:lstStyle/>
-          <a:p>
-            <a:pPr>
-              <a:defRPr sz="1400"/>
-            </a:pPr>
-            <a:r>
-              <a:t>Figure: Web UI showing query input, answer output, and retrieved context.</a:t>
+              <a:t>Thank You</a:t>
+            </a:r>
+          </a:p>
+        </p:txBody>
+      </p:sp>
+      <p:sp>
+        <p:nvSpPr>
+          <p:cNvPr id="3" name="Content Placeholder 2"/>
+          <p:cNvSpPr>
+            <a:spLocks noGrp="1"/>
+          </p:cNvSpPr>
+          <p:nvPr>
+            <p:ph idx="1"/>
+          </p:nvPr>
+        </p:nvSpPr>
+        <p:spPr/>
+        <p:txBody>
+          <a:bodyPr/>
+          <a:lstStyle/>
+          <a:p>
+            <a:pPr>
+              <a:defRPr sz="2200"/>
+            </a:pPr>
+            <a:r>
+              <a:t>Questions and Discussion</a:t>
+            </a:r>
+          </a:p>
+          <a:p>
+            <a:pPr>
+              <a:defRPr sz="2200"/>
+            </a:pPr>
+            <a:r>
+              <a:t>Supervisor Feedback Welcome</a:t>
+            </a:r>
+          </a:p>
+          <a:p>
+            <a:pPr>
+              <a:defRPr sz="2200"/>
+            </a:pPr>
+            <a:r>
+              <a:t>Vels University</a:t>
             </a:r>
           </a:p>
         </p:txBody>
@@ -4092,14 +4064,14 @@
           <a:lstStyle/>
           <a:p>
             <a:r>
-              <a:t>Backend API Screenshot</a:t>
+              <a:t>Application Screenshots (Frontend + Backend)</a:t>
             </a:r>
           </a:p>
         </p:txBody>
       </p:sp>
       <p:pic>
         <p:nvPicPr>
-          <p:cNvPr id="3" name="Picture 2" descr="backend_api_docs.png"/>
+          <p:cNvPr id="3" name="Picture 2" descr="frontend_ui.png"/>
           <p:cNvPicPr>
             <a:picLocks noChangeAspect="1"/>
           </p:cNvPicPr>
@@ -4113,24 +4085,48 @@
         </p:blipFill>
         <p:spPr>
           <a:xfrm>
-            <a:off x="548640" y="1188720"/>
-            <a:ext cx="11064240" cy="5120640"/>
+            <a:off x="457200" y="1188720"/>
+            <a:ext cx="5669280" cy="4389120"/>
           </a:xfrm>
           <a:prstGeom prst="rect">
             <a:avLst/>
           </a:prstGeom>
         </p:spPr>
       </p:pic>
-      <p:sp>
-        <p:nvSpPr>
-          <p:cNvPr id="4" name="TextBox 3"/>
+      <p:pic>
+        <p:nvPicPr>
+          <p:cNvPr id="4" name="Picture 3" descr="backend_api_docs.png"/>
+          <p:cNvPicPr>
+            <a:picLocks noChangeAspect="1"/>
+          </p:cNvPicPr>
+          <p:nvPr/>
+        </p:nvPicPr>
+        <p:blipFill>
+          <a:blip r:embed="rId3"/>
+          <a:stretch>
+            <a:fillRect/>
+          </a:stretch>
+        </p:blipFill>
+        <p:spPr>
+          <a:xfrm>
+            <a:off x="6035040" y="1188720"/>
+            <a:ext cx="5669280" cy="4389120"/>
+          </a:xfrm>
+          <a:prstGeom prst="rect">
+            <a:avLst/>
+          </a:prstGeom>
+        </p:spPr>
+      </p:pic>
+      <p:sp>
+        <p:nvSpPr>
+          <p:cNvPr id="5" name="TextBox 4"/>
           <p:cNvSpPr txBox="1"/>
           <p:nvPr/>
         </p:nvSpPr>
         <p:spPr>
           <a:xfrm>
-            <a:off x="548640" y="6400800"/>
-            <a:ext cx="11064240" cy="457200"/>
+            <a:off x="548640" y="5760720"/>
+            <a:ext cx="11064240" cy="640080"/>
           </a:xfrm>
           <a:prstGeom prst="rect">
             <a:avLst/>
@@ -4147,7 +4143,7 @@
               <a:defRPr sz="1400"/>
             </a:pPr>
             <a:r>
-              <a:t>Figure: FastAPI Swagger docs for backend testing and endpoint validation.</a:t>
+              <a:t>Left: Frontend UI demo | Right: Backend FastAPI Swagger docs</a:t>
             </a:r>
           </a:p>
         </p:txBody>
@@ -4263,449 +4259,6 @@
 </p:sld>
 </file>
 
-<file path=ppt/slides/slide20.xml><?xml version="1.0" encoding="utf-8"?>
-<p:sld xmlns:a="http://schemas.openxmlformats.org/drawingml/2006/main" xmlns:p="http://schemas.openxmlformats.org/presentationml/2006/main" xmlns:r="http://schemas.openxmlformats.org/officeDocument/2006/relationships">
-  <p:cSld>
-    <p:spTree>
-      <p:nvGrpSpPr>
-        <p:cNvPr id="1" name=""/>
-        <p:cNvGrpSpPr/>
-        <p:nvPr/>
-      </p:nvGrpSpPr>
-      <p:grpSpPr/>
-      <p:sp>
-        <p:nvSpPr>
-          <p:cNvPr id="2" name="Title 1"/>
-          <p:cNvSpPr>
-            <a:spLocks noGrp="1"/>
-          </p:cNvSpPr>
-          <p:nvPr>
-            <p:ph type="title"/>
-          </p:nvPr>
-        </p:nvSpPr>
-        <p:spPr/>
-        <p:txBody>
-          <a:bodyPr/>
-          <a:lstStyle/>
-          <a:p>
-            <a:r>
-              <a:t>Six-Month Timeline</a:t>
-            </a:r>
-          </a:p>
-        </p:txBody>
-      </p:sp>
-      <p:sp>
-        <p:nvSpPr>
-          <p:cNvPr id="3" name="Content Placeholder 2"/>
-          <p:cNvSpPr>
-            <a:spLocks noGrp="1"/>
-          </p:cNvSpPr>
-          <p:nvPr>
-            <p:ph idx="1"/>
-          </p:nvPr>
-        </p:nvSpPr>
-        <p:spPr/>
-        <p:txBody>
-          <a:bodyPr/>
-          <a:lstStyle/>
-          <a:p>
-            <a:pPr>
-              <a:defRPr sz="2200"/>
-            </a:pPr>
-            <a:r>
-              <a:t>Month 1: Fundamentals + literature review</a:t>
-            </a:r>
-          </a:p>
-          <a:p>
-            <a:pPr>
-              <a:defRPr sz="2200"/>
-            </a:pPr>
-            <a:r>
-              <a:t>Month 2: Ingestion and indexing</a:t>
-            </a:r>
-          </a:p>
-          <a:p>
-            <a:pPr>
-              <a:defRPr sz="2200"/>
-            </a:pPr>
-            <a:r>
-              <a:t>Month 3: Baseline + RAG implementation</a:t>
-            </a:r>
-          </a:p>
-          <a:p>
-            <a:pPr>
-              <a:defRPr sz="2200"/>
-            </a:pPr>
-            <a:r>
-              <a:t>Month 4: Evaluation module and tuning</a:t>
-            </a:r>
-          </a:p>
-          <a:p>
-            <a:pPr>
-              <a:defRPr sz="2200"/>
-            </a:pPr>
-            <a:r>
-              <a:t>Month 5: Cloud deployment and full testing</a:t>
-            </a:r>
-          </a:p>
-          <a:p>
-            <a:pPr>
-              <a:defRPr sz="2200"/>
-            </a:pPr>
-            <a:r>
-              <a:t>Month 6: Final experiments + dissertation + viva</a:t>
-            </a:r>
-          </a:p>
-        </p:txBody>
-      </p:sp>
-    </p:spTree>
-  </p:cSld>
-  <p:clrMapOvr>
-    <a:masterClrMapping/>
-  </p:clrMapOvr>
-</p:sld>
-</file>
-
-<file path=ppt/slides/slide21.xml><?xml version="1.0" encoding="utf-8"?>
-<p:sld xmlns:a="http://schemas.openxmlformats.org/drawingml/2006/main" xmlns:p="http://schemas.openxmlformats.org/presentationml/2006/main" xmlns:r="http://schemas.openxmlformats.org/officeDocument/2006/relationships">
-  <p:cSld>
-    <p:spTree>
-      <p:nvGrpSpPr>
-        <p:cNvPr id="1" name=""/>
-        <p:cNvGrpSpPr/>
-        <p:nvPr/>
-      </p:nvGrpSpPr>
-      <p:grpSpPr/>
-      <p:sp>
-        <p:nvSpPr>
-          <p:cNvPr id="2" name="Title 1"/>
-          <p:cNvSpPr>
-            <a:spLocks noGrp="1"/>
-          </p:cNvSpPr>
-          <p:nvPr>
-            <p:ph type="title"/>
-          </p:nvPr>
-        </p:nvSpPr>
-        <p:spPr/>
-        <p:txBody>
-          <a:bodyPr/>
-          <a:lstStyle/>
-          <a:p>
-            <a:r>
-              <a:t>Risks and Mitigation</a:t>
-            </a:r>
-          </a:p>
-        </p:txBody>
-      </p:sp>
-      <p:sp>
-        <p:nvSpPr>
-          <p:cNvPr id="3" name="Content Placeholder 2"/>
-          <p:cNvSpPr>
-            <a:spLocks noGrp="1"/>
-          </p:cNvSpPr>
-          <p:nvPr>
-            <p:ph idx="1"/>
-          </p:nvPr>
-        </p:nvSpPr>
-        <p:spPr/>
-        <p:txBody>
-          <a:bodyPr/>
-          <a:lstStyle/>
-          <a:p>
-            <a:pPr>
-              <a:defRPr sz="2200"/>
-            </a:pPr>
-            <a:r>
-              <a:t>Data quality risk -&gt; source validation</a:t>
-            </a:r>
-          </a:p>
-          <a:p>
-            <a:pPr>
-              <a:defRPr sz="2200"/>
-            </a:pPr>
-            <a:r>
-              <a:t>Model/runtime limits -&gt; lighter model fallback</a:t>
-            </a:r>
-          </a:p>
-          <a:p>
-            <a:pPr>
-              <a:defRPr sz="2200"/>
-            </a:pPr>
-            <a:r>
-              <a:t>Cloud security risk -&gt; least privilege and TLS</a:t>
-            </a:r>
-          </a:p>
-          <a:p>
-            <a:pPr>
-              <a:defRPr sz="2200"/>
-            </a:pPr>
-            <a:r>
-              <a:t>Schedule overrun -&gt; weekly milestone tracking</a:t>
-            </a:r>
-          </a:p>
-        </p:txBody>
-      </p:sp>
-    </p:spTree>
-  </p:cSld>
-  <p:clrMapOvr>
-    <a:masterClrMapping/>
-  </p:clrMapOvr>
-</p:sld>
-</file>
-
-<file path=ppt/slides/slide22.xml><?xml version="1.0" encoding="utf-8"?>
-<p:sld xmlns:a="http://schemas.openxmlformats.org/drawingml/2006/main" xmlns:p="http://schemas.openxmlformats.org/presentationml/2006/main" xmlns:r="http://schemas.openxmlformats.org/officeDocument/2006/relationships">
-  <p:cSld>
-    <p:spTree>
-      <p:nvGrpSpPr>
-        <p:cNvPr id="1" name=""/>
-        <p:cNvGrpSpPr/>
-        <p:nvPr/>
-      </p:nvGrpSpPr>
-      <p:grpSpPr/>
-      <p:sp>
-        <p:nvSpPr>
-          <p:cNvPr id="2" name="Title 1"/>
-          <p:cNvSpPr>
-            <a:spLocks noGrp="1"/>
-          </p:cNvSpPr>
-          <p:nvPr>
-            <p:ph type="title"/>
-          </p:nvPr>
-        </p:nvSpPr>
-        <p:spPr/>
-        <p:txBody>
-          <a:bodyPr/>
-          <a:lstStyle/>
-          <a:p>
-            <a:r>
-              <a:t>Expected Outcomes</a:t>
-            </a:r>
-          </a:p>
-        </p:txBody>
-      </p:sp>
-      <p:sp>
-        <p:nvSpPr>
-          <p:cNvPr id="3" name="Content Placeholder 2"/>
-          <p:cNvSpPr>
-            <a:spLocks noGrp="1"/>
-          </p:cNvSpPr>
-          <p:nvPr>
-            <p:ph idx="1"/>
-          </p:nvPr>
-        </p:nvSpPr>
-        <p:spPr/>
-        <p:txBody>
-          <a:bodyPr/>
-          <a:lstStyle/>
-          <a:p>
-            <a:pPr>
-              <a:defRPr sz="2200"/>
-            </a:pPr>
-            <a:r>
-              <a:t>Measured reduction in hallucination with RAG</a:t>
-            </a:r>
-          </a:p>
-          <a:p>
-            <a:pPr>
-              <a:defRPr sz="2200"/>
-            </a:pPr>
-            <a:r>
-              <a:t>Improved factual grounding and answer trustworthiness</a:t>
-            </a:r>
-          </a:p>
-          <a:p>
-            <a:pPr>
-              <a:defRPr sz="2200"/>
-            </a:pPr>
-            <a:r>
-              <a:t>Reproducible academic and technical artifacts</a:t>
-            </a:r>
-          </a:p>
-          <a:p>
-            <a:pPr>
-              <a:defRPr sz="2200"/>
-            </a:pPr>
-            <a:r>
-              <a:t>Practical guidance for enterprise AI assistants</a:t>
-            </a:r>
-          </a:p>
-        </p:txBody>
-      </p:sp>
-    </p:spTree>
-  </p:cSld>
-  <p:clrMapOvr>
-    <a:masterClrMapping/>
-  </p:clrMapOvr>
-</p:sld>
-</file>
-
-<file path=ppt/slides/slide23.xml><?xml version="1.0" encoding="utf-8"?>
-<p:sld xmlns:a="http://schemas.openxmlformats.org/drawingml/2006/main" xmlns:p="http://schemas.openxmlformats.org/presentationml/2006/main" xmlns:r="http://schemas.openxmlformats.org/officeDocument/2006/relationships">
-  <p:cSld>
-    <p:spTree>
-      <p:nvGrpSpPr>
-        <p:cNvPr id="1" name=""/>
-        <p:cNvGrpSpPr/>
-        <p:nvPr/>
-      </p:nvGrpSpPr>
-      <p:grpSpPr/>
-      <p:sp>
-        <p:nvSpPr>
-          <p:cNvPr id="2" name="Title 1"/>
-          <p:cNvSpPr>
-            <a:spLocks noGrp="1"/>
-          </p:cNvSpPr>
-          <p:nvPr>
-            <p:ph type="title"/>
-          </p:nvPr>
-        </p:nvSpPr>
-        <p:spPr/>
-        <p:txBody>
-          <a:bodyPr/>
-          <a:lstStyle/>
-          <a:p>
-            <a:r>
-              <a:t>Conclusion</a:t>
-            </a:r>
-          </a:p>
-        </p:txBody>
-      </p:sp>
-      <p:sp>
-        <p:nvSpPr>
-          <p:cNvPr id="3" name="Content Placeholder 2"/>
-          <p:cNvSpPr>
-            <a:spLocks noGrp="1"/>
-          </p:cNvSpPr>
-          <p:nvPr>
-            <p:ph idx="1"/>
-          </p:nvPr>
-        </p:nvSpPr>
-        <p:spPr/>
-        <p:txBody>
-          <a:bodyPr/>
-          <a:lstStyle/>
-          <a:p>
-            <a:pPr>
-              <a:defRPr sz="2200"/>
-            </a:pPr>
-            <a:r>
-              <a:t>RAG is a practical method to improve factual reliability</a:t>
-            </a:r>
-          </a:p>
-          <a:p>
-            <a:pPr>
-              <a:defRPr sz="2200"/>
-            </a:pPr>
-            <a:r>
-              <a:t>This project combines engineering and experimental rigor</a:t>
-            </a:r>
-          </a:p>
-          <a:p>
-            <a:pPr>
-              <a:defRPr sz="2200"/>
-            </a:pPr>
-            <a:r>
-              <a:t>Framework is cloud-ready and reproducible</a:t>
-            </a:r>
-          </a:p>
-          <a:p>
-            <a:pPr>
-              <a:defRPr sz="2200"/>
-            </a:pPr>
-            <a:r>
-              <a:t>Future work: reranking, citation verification, human eval</a:t>
-            </a:r>
-          </a:p>
-        </p:txBody>
-      </p:sp>
-    </p:spTree>
-  </p:cSld>
-  <p:clrMapOvr>
-    <a:masterClrMapping/>
-  </p:clrMapOvr>
-</p:sld>
-</file>
-
-<file path=ppt/slides/slide24.xml><?xml version="1.0" encoding="utf-8"?>
-<p:sld xmlns:a="http://schemas.openxmlformats.org/drawingml/2006/main" xmlns:p="http://schemas.openxmlformats.org/presentationml/2006/main" xmlns:r="http://schemas.openxmlformats.org/officeDocument/2006/relationships">
-  <p:cSld>
-    <p:spTree>
-      <p:nvGrpSpPr>
-        <p:cNvPr id="1" name=""/>
-        <p:cNvGrpSpPr/>
-        <p:nvPr/>
-      </p:nvGrpSpPr>
-      <p:grpSpPr/>
-      <p:sp>
-        <p:nvSpPr>
-          <p:cNvPr id="2" name="Title 1"/>
-          <p:cNvSpPr>
-            <a:spLocks noGrp="1"/>
-          </p:cNvSpPr>
-          <p:nvPr>
-            <p:ph type="title"/>
-          </p:nvPr>
-        </p:nvSpPr>
-        <p:spPr/>
-        <p:txBody>
-          <a:bodyPr/>
-          <a:lstStyle/>
-          <a:p>
-            <a:r>
-              <a:t>Thank You</a:t>
-            </a:r>
-          </a:p>
-        </p:txBody>
-      </p:sp>
-      <p:sp>
-        <p:nvSpPr>
-          <p:cNvPr id="3" name="Content Placeholder 2"/>
-          <p:cNvSpPr>
-            <a:spLocks noGrp="1"/>
-          </p:cNvSpPr>
-          <p:nvPr>
-            <p:ph idx="1"/>
-          </p:nvPr>
-        </p:nvSpPr>
-        <p:spPr/>
-        <p:txBody>
-          <a:bodyPr/>
-          <a:lstStyle/>
-          <a:p>
-            <a:pPr>
-              <a:defRPr sz="2200"/>
-            </a:pPr>
-            <a:r>
-              <a:t>Questions and Discussion</a:t>
-            </a:r>
-          </a:p>
-          <a:p>
-            <a:pPr>
-              <a:defRPr sz="2200"/>
-            </a:pPr>
-            <a:r>
-              <a:t>Supervisor Feedback Welcome</a:t>
-            </a:r>
-          </a:p>
-          <a:p>
-            <a:pPr>
-              <a:defRPr sz="2200"/>
-            </a:pPr>
-            <a:r>
-              <a:t>Vels University</a:t>
-            </a:r>
-          </a:p>
-        </p:txBody>
-      </p:sp>
-    </p:spTree>
-  </p:cSld>
-  <p:clrMapOvr>
-    <a:masterClrMapping/>
-  </p:clrMapOvr>
-</p:sld>
-</file>
-
 <file path=ppt/slides/slide3.xml><?xml version="1.0" encoding="utf-8"?>
 <p:sld xmlns:a="http://schemas.openxmlformats.org/drawingml/2006/main" xmlns:p="http://schemas.openxmlformats.org/presentationml/2006/main" xmlns:r="http://schemas.openxmlformats.org/officeDocument/2006/relationships">
   <p:cSld>
@@ -4732,7 +4285,7 @@
           <a:lstStyle/>
           <a:p>
             <a:r>
-              <a:t>Contact and Repository</a:t>
+              <a:t>Agenda</a:t>
             </a:r>
           </a:p>
         </p:txBody>
@@ -4756,23 +4309,39 @@
               <a:defRPr sz="2200"/>
             </a:pPr>
             <a:r>
-              <a:t>Email: sunadrsundar0004@gmail.com</a:t>
-            </a:r>
-          </a:p>
-          <a:p>
-            <a:pPr>
-              <a:defRPr sz="2200"/>
-            </a:pPr>
-            <a:r>
-              <a:t>Phone: 7904117804</a:t>
-            </a:r>
-          </a:p>
-          <a:p>
-            <a:pPr>
-              <a:defRPr sz="2200"/>
-            </a:pPr>
-            <a:r>
-              <a:t>GitHub Repository: https://github.com/sundar0004/-Cloud-Based-RAG.git</a:t>
+              <a:t>Problem and motivation</a:t>
+            </a:r>
+          </a:p>
+          <a:p>
+            <a:pPr>
+              <a:defRPr sz="2200"/>
+            </a:pPr>
+            <a:r>
+              <a:t>Research objectives and questions</a:t>
+            </a:r>
+          </a:p>
+          <a:p>
+            <a:pPr>
+              <a:defRPr sz="2200"/>
+            </a:pPr>
+            <a:r>
+              <a:t>System architecture and implementation</a:t>
+            </a:r>
+          </a:p>
+          <a:p>
+            <a:pPr>
+              <a:defRPr sz="2200"/>
+            </a:pPr>
+            <a:r>
+              <a:t>Experiments and evaluation metrics</a:t>
+            </a:r>
+          </a:p>
+          <a:p>
+            <a:pPr>
+              <a:defRPr sz="2200"/>
+            </a:pPr>
+            <a:r>
+              <a:t>Results, limitations, and future work</a:t>
             </a:r>
           </a:p>
         </p:txBody>
@@ -4811,7 +4380,7 @@
           <a:lstStyle/>
           <a:p>
             <a:r>
-              <a:t>Agenda</a:t>
+              <a:t>Problem Statement</a:t>
             </a:r>
           </a:p>
         </p:txBody>
@@ -4835,39 +4404,31 @@
               <a:defRPr sz="2200"/>
             </a:pPr>
             <a:r>
-              <a:t>Problem and motivation</a:t>
-            </a:r>
-          </a:p>
-          <a:p>
-            <a:pPr>
-              <a:defRPr sz="2200"/>
-            </a:pPr>
-            <a:r>
-              <a:t>Research objectives and questions</a:t>
-            </a:r>
-          </a:p>
-          <a:p>
-            <a:pPr>
-              <a:defRPr sz="2200"/>
-            </a:pPr>
-            <a:r>
-              <a:t>System architecture and implementation</a:t>
-            </a:r>
-          </a:p>
-          <a:p>
-            <a:pPr>
-              <a:defRPr sz="2200"/>
-            </a:pPr>
-            <a:r>
-              <a:t>Experiments and evaluation metrics</a:t>
-            </a:r>
-          </a:p>
-          <a:p>
-            <a:pPr>
-              <a:defRPr sz="2200"/>
-            </a:pPr>
-            <a:r>
-              <a:t>Results, limitations, and future work</a:t>
+              <a:t>LLMs can generate fluent but factually incorrect responses</a:t>
+            </a:r>
+          </a:p>
+          <a:p>
+            <a:pPr>
+              <a:defRPr sz="2200"/>
+            </a:pPr>
+            <a:r>
+              <a:t>Hallucination is a major blocker for enterprise adoption</a:t>
+            </a:r>
+          </a:p>
+          <a:p>
+            <a:pPr>
+              <a:defRPr sz="2200"/>
+            </a:pPr>
+            <a:r>
+              <a:t>Pure prompt engineering is often insufficient</a:t>
+            </a:r>
+          </a:p>
+          <a:p>
+            <a:pPr>
+              <a:defRPr sz="2200"/>
+            </a:pPr>
+            <a:r>
+              <a:t>Need retrieval-grounded generation for reliability</a:t>
             </a:r>
           </a:p>
         </p:txBody>
@@ -4906,7 +4467,7 @@
           <a:lstStyle/>
           <a:p>
             <a:r>
-              <a:t>Problem Statement</a:t>
+              <a:t>Project Aim and Objectives</a:t>
             </a:r>
           </a:p>
         </p:txBody>
@@ -4930,31 +4491,31 @@
               <a:defRPr sz="2200"/>
             </a:pPr>
             <a:r>
-              <a:t>LLMs can generate fluent but factually incorrect responses</a:t>
-            </a:r>
-          </a:p>
-          <a:p>
-            <a:pPr>
-              <a:defRPr sz="2200"/>
-            </a:pPr>
-            <a:r>
-              <a:t>Hallucination is a major blocker for enterprise adoption</a:t>
-            </a:r>
-          </a:p>
-          <a:p>
-            <a:pPr>
-              <a:defRPr sz="2200"/>
-            </a:pPr>
-            <a:r>
-              <a:t>Pure prompt engineering is often insufficient</a:t>
-            </a:r>
-          </a:p>
-          <a:p>
-            <a:pPr>
-              <a:defRPr sz="2200"/>
-            </a:pPr>
-            <a:r>
-              <a:t>Need retrieval-grounded generation for reliability</a:t>
+              <a:t>Design a cloud-based RAG framework</a:t>
+            </a:r>
+          </a:p>
+          <a:p>
+            <a:pPr>
+              <a:defRPr sz="2200"/>
+            </a:pPr>
+            <a:r>
+              <a:t>Compare baseline LLM vs RAG-enhanced LLM</a:t>
+            </a:r>
+          </a:p>
+          <a:p>
+            <a:pPr>
+              <a:defRPr sz="2200"/>
+            </a:pPr>
+            <a:r>
+              <a:t>Measure factuality, hallucination, retrieval quality, and latency</a:t>
+            </a:r>
+          </a:p>
+          <a:p>
+            <a:pPr>
+              <a:defRPr sz="2200"/>
+            </a:pPr>
+            <a:r>
+              <a:t>Deliver a reproducible API + Docker deployment</a:t>
             </a:r>
           </a:p>
         </p:txBody>
@@ -4993,7 +4554,7 @@
           <a:lstStyle/>
           <a:p>
             <a:r>
-              <a:t>Project Aim and Objectives</a:t>
+              <a:t>Research Questions</a:t>
             </a:r>
           </a:p>
         </p:txBody>
@@ -5017,31 +4578,23 @@
               <a:defRPr sz="2200"/>
             </a:pPr>
             <a:r>
-              <a:t>Design a cloud-based RAG framework</a:t>
-            </a:r>
-          </a:p>
-          <a:p>
-            <a:pPr>
-              <a:defRPr sz="2200"/>
-            </a:pPr>
-            <a:r>
-              <a:t>Compare baseline LLM vs RAG-enhanced LLM</a:t>
-            </a:r>
-          </a:p>
-          <a:p>
-            <a:pPr>
-              <a:defRPr sz="2200"/>
-            </a:pPr>
-            <a:r>
-              <a:t>Measure factuality, hallucination, retrieval quality, and latency</a:t>
-            </a:r>
-          </a:p>
-          <a:p>
-            <a:pPr>
-              <a:defRPr sz="2200"/>
-            </a:pPr>
-            <a:r>
-              <a:t>Deliver a reproducible API + Docker deployment</a:t>
+              <a:t>RQ1: Does RAG reduce hallucination vs baseline LLM?</a:t>
+            </a:r>
+          </a:p>
+          <a:p>
+            <a:pPr>
+              <a:defRPr sz="2200"/>
+            </a:pPr>
+            <a:r>
+              <a:t>RQ2: What latency tradeoff does retrieval introduce?</a:t>
+            </a:r>
+          </a:p>
+          <a:p>
+            <a:pPr>
+              <a:defRPr sz="2200"/>
+            </a:pPr>
+            <a:r>
+              <a:t>RQ3: Which context settings improve answer quality most?</a:t>
             </a:r>
           </a:p>
         </p:txBody>
@@ -5080,7 +4633,7 @@
           <a:lstStyle/>
           <a:p>
             <a:r>
-              <a:t>Research Questions</a:t>
+              <a:t>Literature Foundation</a:t>
             </a:r>
           </a:p>
         </p:txBody>
@@ -5104,23 +4657,31 @@
               <a:defRPr sz="2200"/>
             </a:pPr>
             <a:r>
-              <a:t>RQ1: Does RAG reduce hallucination vs baseline LLM?</a:t>
-            </a:r>
-          </a:p>
-          <a:p>
-            <a:pPr>
-              <a:defRPr sz="2200"/>
-            </a:pPr>
-            <a:r>
-              <a:t>RQ2: What latency tradeoff does retrieval introduce?</a:t>
-            </a:r>
-          </a:p>
-          <a:p>
-            <a:pPr>
-              <a:defRPr sz="2200"/>
-            </a:pPr>
-            <a:r>
-              <a:t>RQ3: Which context settings improve answer quality most?</a:t>
+              <a:t>Transformers: Attention Is All You Need (2017)</a:t>
+            </a:r>
+          </a:p>
+          <a:p>
+            <a:pPr>
+              <a:defRPr sz="2200"/>
+            </a:pPr>
+            <a:r>
+              <a:t>LLM scaling: GPT few-shot learning (2020)</a:t>
+            </a:r>
+          </a:p>
+          <a:p>
+            <a:pPr>
+              <a:defRPr sz="2200"/>
+            </a:pPr>
+            <a:r>
+              <a:t>RAG for knowledge-intensive tasks (2020)</a:t>
+            </a:r>
+          </a:p>
+          <a:p>
+            <a:pPr>
+              <a:defRPr sz="2200"/>
+            </a:pPr>
+            <a:r>
+              <a:t>Dense retrieval and vector search (DPR + FAISS)</a:t>
             </a:r>
           </a:p>
         </p:txBody>
@@ -5159,7 +4720,7 @@
           <a:lstStyle/>
           <a:p>
             <a:r>
-              <a:t>Literature Foundation</a:t>
+              <a:t>Proposed Workflow</a:t>
             </a:r>
           </a:p>
         </p:txBody>
@@ -5183,31 +4744,47 @@
               <a:defRPr sz="2200"/>
             </a:pPr>
             <a:r>
-              <a:t>Transformers: Attention Is All You Need (2017)</a:t>
-            </a:r>
-          </a:p>
-          <a:p>
-            <a:pPr>
-              <a:defRPr sz="2200"/>
-            </a:pPr>
-            <a:r>
-              <a:t>LLM scaling: GPT few-shot learning (2020)</a:t>
-            </a:r>
-          </a:p>
-          <a:p>
-            <a:pPr>
-              <a:defRPr sz="2200"/>
-            </a:pPr>
-            <a:r>
-              <a:t>RAG for knowledge-intensive tasks (2020)</a:t>
-            </a:r>
-          </a:p>
-          <a:p>
-            <a:pPr>
-              <a:defRPr sz="2200"/>
-            </a:pPr>
-            <a:r>
-              <a:t>Dense retrieval and vector search (DPR + FAISS)</a:t>
+              <a:t>Document collection (PDF/TXT/MD)</a:t>
+            </a:r>
+          </a:p>
+          <a:p>
+            <a:pPr>
+              <a:defRPr sz="2200"/>
+            </a:pPr>
+            <a:r>
+              <a:t>Text extraction and chunking</a:t>
+            </a:r>
+          </a:p>
+          <a:p>
+            <a:pPr>
+              <a:defRPr sz="2200"/>
+            </a:pPr>
+            <a:r>
+              <a:t>Embedding generation (Sentence Transformers)</a:t>
+            </a:r>
+          </a:p>
+          <a:p>
+            <a:pPr>
+              <a:defRPr sz="2200"/>
+            </a:pPr>
+            <a:r>
+              <a:t>FAISS indexing and top-k retrieval</a:t>
+            </a:r>
+          </a:p>
+          <a:p>
+            <a:pPr>
+              <a:defRPr sz="2200"/>
+            </a:pPr>
+            <a:r>
+              <a:t>Context injection and LLM answer generation</a:t>
+            </a:r>
+          </a:p>
+          <a:p>
+            <a:pPr>
+              <a:defRPr sz="2200"/>
+            </a:pPr>
+            <a:r>
+              <a:t>Evaluation and comparison</a:t>
             </a:r>
           </a:p>
         </p:txBody>
@@ -5246,7 +4823,7 @@
           <a:lstStyle/>
           <a:p>
             <a:r>
-              <a:t>Proposed Workflow</a:t>
+              <a:t>System Architecture</a:t>
             </a:r>
           </a:p>
         </p:txBody>
@@ -5270,47 +4847,39 @@
               <a:defRPr sz="2200"/>
             </a:pPr>
             <a:r>
-              <a:t>Document collection (PDF/TXT/MD)</a:t>
-            </a:r>
-          </a:p>
-          <a:p>
-            <a:pPr>
-              <a:defRPr sz="2200"/>
-            </a:pPr>
-            <a:r>
-              <a:t>Text extraction and chunking</a:t>
-            </a:r>
-          </a:p>
-          <a:p>
-            <a:pPr>
-              <a:defRPr sz="2200"/>
-            </a:pPr>
-            <a:r>
-              <a:t>Embedding generation (Sentence Transformers)</a:t>
-            </a:r>
-          </a:p>
-          <a:p>
-            <a:pPr>
-              <a:defRPr sz="2200"/>
-            </a:pPr>
-            <a:r>
-              <a:t>FAISS indexing and top-k retrieval</a:t>
-            </a:r>
-          </a:p>
-          <a:p>
-            <a:pPr>
-              <a:defRPr sz="2200"/>
-            </a:pPr>
-            <a:r>
-              <a:t>Context injection and LLM answer generation</a:t>
-            </a:r>
-          </a:p>
-          <a:p>
-            <a:pPr>
-              <a:defRPr sz="2200"/>
-            </a:pPr>
-            <a:r>
-              <a:t>Evaluation and comparison</a:t>
+              <a:t>User -&gt; FastAPI API Layer</a:t>
+            </a:r>
+          </a:p>
+          <a:p>
+            <a:pPr>
+              <a:defRPr sz="2200"/>
+            </a:pPr>
+            <a:r>
+              <a:t>Query Encoder -&gt; FAISS Vector Search</a:t>
+            </a:r>
+          </a:p>
+          <a:p>
+            <a:pPr>
+              <a:defRPr sz="2200"/>
+            </a:pPr>
+            <a:r>
+              <a:t>Top-k Context Retrieval</a:t>
+            </a:r>
+          </a:p>
+          <a:p>
+            <a:pPr>
+              <a:defRPr sz="2200"/>
+            </a:pPr>
+            <a:r>
+              <a:t>Prompt Builder -&gt; LLM Generator</a:t>
+            </a:r>
+          </a:p>
+          <a:p>
+            <a:pPr>
+              <a:defRPr sz="2200"/>
+            </a:pPr>
+            <a:r>
+              <a:t>Evaluation Module -&gt; Response + Metrics</a:t>
             </a:r>
           </a:p>
         </p:txBody>

</xml_diff>